<commit_message>
adding readme & analysis
</commit_message>
<xml_diff>
--- a/Estimating Retail Turnover using Geospatial and Open-Source Data.pptx
+++ b/Estimating Retail Turnover using Geospatial and Open-Source Data.pptx
@@ -130,6 +130,1088 @@
 </p:presentation>
 </file>
 
+<file path=ppt/revisionInfo.xml><?xml version="1.0" encoding="utf-8"?>
+<p1510:revInfo xmlns:a="http://schemas.openxmlformats.org/drawingml/2006/main" xmlns:r="http://schemas.openxmlformats.org/officeDocument/2006/relationships" xmlns:p1510="http://schemas.microsoft.com/office/powerpoint/2015/10/main">
+  <p1510:revLst>
+    <p1510:client id="{9F9DB648-5529-44A9-896A-95B2F8BB61D5}" v="47" dt="2024-11-25T18:04:45.140"/>
+  </p1510:revLst>
+</p1510:revInfo>
+</file>
+
+<file path=ppt/changesInfos/changesInfo1.xml><?xml version="1.0" encoding="utf-8"?>
+<pc:chgInfo xmlns:a="http://schemas.openxmlformats.org/drawingml/2006/main" xmlns:r="http://schemas.openxmlformats.org/officeDocument/2006/relationships" xmlns:ac="http://schemas.microsoft.com/office/drawing/2013/main/command" xmlns:pc="http://schemas.microsoft.com/office/powerpoint/2013/main/command">
+  <pc:docChgLst>
+    <pc:chgData name="Wail Baalawi" userId="ca0f7d7f-a50f-459f-9d9f-abffb0581211" providerId="ADAL" clId="{9F9DB648-5529-44A9-896A-95B2F8BB61D5}"/>
+    <pc:docChg chg="undo custSel modSld">
+      <pc:chgData name="Wail Baalawi" userId="ca0f7d7f-a50f-459f-9d9f-abffb0581211" providerId="ADAL" clId="{9F9DB648-5529-44A9-896A-95B2F8BB61D5}" dt="2024-11-25T18:04:45.457" v="1205" actId="1076"/>
+      <pc:docMkLst>
+        <pc:docMk/>
+      </pc:docMkLst>
+      <pc:sldChg chg="modNotesTx">
+        <pc:chgData name="Wail Baalawi" userId="ca0f7d7f-a50f-459f-9d9f-abffb0581211" providerId="ADAL" clId="{9F9DB648-5529-44A9-896A-95B2F8BB61D5}" dt="2024-11-25T16:22:55.428" v="552" actId="20577"/>
+        <pc:sldMkLst>
+          <pc:docMk/>
+          <pc:sldMk cId="0" sldId="257"/>
+        </pc:sldMkLst>
+      </pc:sldChg>
+      <pc:sldChg chg="modNotesTx">
+        <pc:chgData name="Wail Baalawi" userId="ca0f7d7f-a50f-459f-9d9f-abffb0581211" providerId="ADAL" clId="{9F9DB648-5529-44A9-896A-95B2F8BB61D5}" dt="2024-11-25T16:24:06.587" v="572" actId="20577"/>
+        <pc:sldMkLst>
+          <pc:docMk/>
+          <pc:sldMk cId="0" sldId="261"/>
+        </pc:sldMkLst>
+      </pc:sldChg>
+      <pc:sldChg chg="modNotesTx">
+        <pc:chgData name="Wail Baalawi" userId="ca0f7d7f-a50f-459f-9d9f-abffb0581211" providerId="ADAL" clId="{9F9DB648-5529-44A9-896A-95B2F8BB61D5}" dt="2024-11-25T16:23:26.355" v="564" actId="20577"/>
+        <pc:sldMkLst>
+          <pc:docMk/>
+          <pc:sldMk cId="0" sldId="263"/>
+        </pc:sldMkLst>
+      </pc:sldChg>
+      <pc:sldChg chg="modNotesTx">
+        <pc:chgData name="Wail Baalawi" userId="ca0f7d7f-a50f-459f-9d9f-abffb0581211" providerId="ADAL" clId="{9F9DB648-5529-44A9-896A-95B2F8BB61D5}" dt="2024-11-25T16:25:17.350" v="596" actId="15"/>
+        <pc:sldMkLst>
+          <pc:docMk/>
+          <pc:sldMk cId="616771934" sldId="272"/>
+        </pc:sldMkLst>
+      </pc:sldChg>
+      <pc:sldChg chg="modNotesTx">
+        <pc:chgData name="Wail Baalawi" userId="ca0f7d7f-a50f-459f-9d9f-abffb0581211" providerId="ADAL" clId="{9F9DB648-5529-44A9-896A-95B2F8BB61D5}" dt="2024-11-25T16:27:41.034" v="643" actId="20577"/>
+        <pc:sldMkLst>
+          <pc:docMk/>
+          <pc:sldMk cId="62366509" sldId="273"/>
+        </pc:sldMkLst>
+      </pc:sldChg>
+      <pc:sldChg chg="modNotesTx">
+        <pc:chgData name="Wail Baalawi" userId="ca0f7d7f-a50f-459f-9d9f-abffb0581211" providerId="ADAL" clId="{9F9DB648-5529-44A9-896A-95B2F8BB61D5}" dt="2024-11-25T16:28:24.680" v="658" actId="15"/>
+        <pc:sldMkLst>
+          <pc:docMk/>
+          <pc:sldMk cId="2332235385" sldId="274"/>
+        </pc:sldMkLst>
+      </pc:sldChg>
+      <pc:sldChg chg="modNotesTx">
+        <pc:chgData name="Wail Baalawi" userId="ca0f7d7f-a50f-459f-9d9f-abffb0581211" providerId="ADAL" clId="{9F9DB648-5529-44A9-896A-95B2F8BB61D5}" dt="2024-11-25T16:28:58.527" v="666" actId="15"/>
+        <pc:sldMkLst>
+          <pc:docMk/>
+          <pc:sldMk cId="103113861" sldId="276"/>
+        </pc:sldMkLst>
+      </pc:sldChg>
+      <pc:sldChg chg="modSp mod modNotesTx">
+        <pc:chgData name="Wail Baalawi" userId="ca0f7d7f-a50f-459f-9d9f-abffb0581211" providerId="ADAL" clId="{9F9DB648-5529-44A9-896A-95B2F8BB61D5}" dt="2024-11-25T17:42:23.360" v="756" actId="1076"/>
+        <pc:sldMkLst>
+          <pc:docMk/>
+          <pc:sldMk cId="32178151" sldId="277"/>
+        </pc:sldMkLst>
+        <pc:spChg chg="mod">
+          <ac:chgData name="Wail Baalawi" userId="ca0f7d7f-a50f-459f-9d9f-abffb0581211" providerId="ADAL" clId="{9F9DB648-5529-44A9-896A-95B2F8BB61D5}" dt="2024-11-25T17:42:23.360" v="756" actId="1076"/>
+          <ac:spMkLst>
+            <pc:docMk/>
+            <pc:sldMk cId="32178151" sldId="277"/>
+            <ac:spMk id="4" creationId="{804651B8-C880-A290-ECB4-AD2FA09F9684}"/>
+          </ac:spMkLst>
+        </pc:spChg>
+      </pc:sldChg>
+      <pc:sldChg chg="addSp delSp modSp mod modNotesTx">
+        <pc:chgData name="Wail Baalawi" userId="ca0f7d7f-a50f-459f-9d9f-abffb0581211" providerId="ADAL" clId="{9F9DB648-5529-44A9-896A-95B2F8BB61D5}" dt="2024-11-25T18:04:45.457" v="1205" actId="1076"/>
+        <pc:sldMkLst>
+          <pc:docMk/>
+          <pc:sldMk cId="3335376486" sldId="278"/>
+        </pc:sldMkLst>
+        <pc:spChg chg="del mod">
+          <ac:chgData name="Wail Baalawi" userId="ca0f7d7f-a50f-459f-9d9f-abffb0581211" providerId="ADAL" clId="{9F9DB648-5529-44A9-896A-95B2F8BB61D5}" dt="2024-11-25T17:57:54.682" v="1112" actId="1957"/>
+          <ac:spMkLst>
+            <pc:docMk/>
+            <pc:sldMk cId="3335376486" sldId="278"/>
+            <ac:spMk id="3" creationId="{619425CA-136E-9DAF-C8B5-BDED0DE1DF5B}"/>
+          </ac:spMkLst>
+        </pc:spChg>
+        <pc:spChg chg="add del">
+          <ac:chgData name="Wail Baalawi" userId="ca0f7d7f-a50f-459f-9d9f-abffb0581211" providerId="ADAL" clId="{9F9DB648-5529-44A9-896A-95B2F8BB61D5}" dt="2024-11-25T16:30:14.808" v="675" actId="22"/>
+          <ac:spMkLst>
+            <pc:docMk/>
+            <pc:sldMk cId="3335376486" sldId="278"/>
+            <ac:spMk id="6" creationId="{979C1B47-8D2D-F7CA-7FAD-C63E46546584}"/>
+          </ac:spMkLst>
+        </pc:spChg>
+        <pc:graphicFrameChg chg="mod modGraphic">
+          <ac:chgData name="Wail Baalawi" userId="ca0f7d7f-a50f-459f-9d9f-abffb0581211" providerId="ADAL" clId="{9F9DB648-5529-44A9-896A-95B2F8BB61D5}" dt="2024-11-25T18:04:45.457" v="1205" actId="1076"/>
+          <ac:graphicFrameMkLst>
+            <pc:docMk/>
+            <pc:sldMk cId="3335376486" sldId="278"/>
+            <ac:graphicFrameMk id="5" creationId="{9F71CD39-8B4A-A32E-A34F-2C409142CEBB}"/>
+          </ac:graphicFrameMkLst>
+        </pc:graphicFrameChg>
+        <pc:graphicFrameChg chg="add mod">
+          <ac:chgData name="Wail Baalawi" userId="ca0f7d7f-a50f-459f-9d9f-abffb0581211" providerId="ADAL" clId="{9F9DB648-5529-44A9-896A-95B2F8BB61D5}" dt="2024-11-25T18:02:26.596" v="1171" actId="1076"/>
+          <ac:graphicFrameMkLst>
+            <pc:docMk/>
+            <pc:sldMk cId="3335376486" sldId="278"/>
+            <ac:graphicFrameMk id="9" creationId="{1141A441-4DDF-BCFD-8BDA-AD78457C6647}"/>
+          </ac:graphicFrameMkLst>
+        </pc:graphicFrameChg>
+        <pc:graphicFrameChg chg="add mod">
+          <ac:chgData name="Wail Baalawi" userId="ca0f7d7f-a50f-459f-9d9f-abffb0581211" providerId="ADAL" clId="{9F9DB648-5529-44A9-896A-95B2F8BB61D5}" dt="2024-11-25T18:04:42.817" v="1204" actId="1076"/>
+          <ac:graphicFrameMkLst>
+            <pc:docMk/>
+            <pc:sldMk cId="3335376486" sldId="278"/>
+            <ac:graphicFrameMk id="10" creationId="{EC643293-1679-C7F7-A20B-845062E22BA4}"/>
+          </ac:graphicFrameMkLst>
+        </pc:graphicFrameChg>
+      </pc:sldChg>
+      <pc:sldChg chg="modNotesTx">
+        <pc:chgData name="Wail Baalawi" userId="ca0f7d7f-a50f-459f-9d9f-abffb0581211" providerId="ADAL" clId="{9F9DB648-5529-44A9-896A-95B2F8BB61D5}" dt="2024-11-25T16:29:53.171" v="673" actId="12"/>
+        <pc:sldMkLst>
+          <pc:docMk/>
+          <pc:sldMk cId="1939739114" sldId="279"/>
+        </pc:sldMkLst>
+      </pc:sldChg>
+    </pc:docChg>
+  </pc:docChgLst>
+</pc:chgInfo>
+</file>
+
+<file path=ppt/charts/chart1.xml><?xml version="1.0" encoding="utf-8"?>
+<c:chartSpace xmlns:c="http://schemas.openxmlformats.org/drawingml/2006/chart" xmlns:a="http://schemas.openxmlformats.org/drawingml/2006/main" xmlns:r="http://schemas.openxmlformats.org/officeDocument/2006/relationships" xmlns:c16r2="http://schemas.microsoft.com/office/drawing/2015/06/chart">
+  <c:date1904 val="0"/>
+  <c:lang val="en-US"/>
+  <c:roundedCorners val="0"/>
+  <mc:AlternateContent xmlns:mc="http://schemas.openxmlformats.org/markup-compatibility/2006">
+    <mc:Choice xmlns:c14="http://schemas.microsoft.com/office/drawing/2007/8/2/chart" Requires="c14">
+      <c14:style val="102"/>
+    </mc:Choice>
+    <mc:Fallback>
+      <c:style val="2"/>
+    </mc:Fallback>
+  </mc:AlternateContent>
+  <c:chart>
+    <c:title>
+      <c:tx>
+        <c:rich>
+          <a:bodyPr rot="0" spcFirstLastPara="1" vertOverflow="ellipsis" vert="horz" wrap="square" anchor="ctr" anchorCtr="1"/>
+          <a:lstStyle/>
+          <a:p>
+            <a:pPr>
+              <a:defRPr sz="1440" b="0" i="0" u="none" strike="noStrike" kern="1200" spc="0" baseline="0">
+                <a:solidFill>
+                  <a:schemeClr val="tx1">
+                    <a:lumMod val="65000"/>
+                    <a:lumOff val="35000"/>
+                  </a:schemeClr>
+                </a:solidFill>
+                <a:latin typeface="+mn-lt"/>
+                <a:ea typeface="+mn-ea"/>
+                <a:cs typeface="+mn-cs"/>
+              </a:defRPr>
+            </a:pPr>
+            <a:r>
+              <a:rPr lang="en-GB"/>
+              <a:t>Asda Levenshulme Supermarket</a:t>
+            </a:r>
+          </a:p>
+        </c:rich>
+      </c:tx>
+      <c:overlay val="0"/>
+      <c:spPr>
+        <a:noFill/>
+        <a:ln>
+          <a:noFill/>
+        </a:ln>
+        <a:effectLst/>
+      </c:spPr>
+      <c:txPr>
+        <a:bodyPr rot="0" spcFirstLastPara="1" vertOverflow="ellipsis" vert="horz" wrap="square" anchor="ctr" anchorCtr="1"/>
+        <a:lstStyle/>
+        <a:p>
+          <a:pPr>
+            <a:defRPr sz="1440" b="0" i="0" u="none" strike="noStrike" kern="1200" spc="0" baseline="0">
+              <a:solidFill>
+                <a:schemeClr val="tx1">
+                  <a:lumMod val="65000"/>
+                  <a:lumOff val="35000"/>
+                </a:schemeClr>
+              </a:solidFill>
+              <a:latin typeface="+mn-lt"/>
+              <a:ea typeface="+mn-ea"/>
+              <a:cs typeface="+mn-cs"/>
+            </a:defRPr>
+          </a:pPr>
+          <a:endParaRPr lang="en-US"/>
+        </a:p>
+      </c:txPr>
+    </c:title>
+    <c:autoTitleDeleted val="0"/>
+    <c:plotArea>
+      <c:layout/>
+      <c:barChart>
+        <c:barDir val="col"/>
+        <c:grouping val="clustered"/>
+        <c:varyColors val="0"/>
+        <c:ser>
+          <c:idx val="0"/>
+          <c:order val="0"/>
+          <c:tx>
+            <c:strRef>
+              <c:f>Sheet1!$B$1</c:f>
+              <c:strCache>
+                <c:ptCount val="1"/>
+                <c:pt idx="0">
+                  <c:v>Actual</c:v>
+                </c:pt>
+              </c:strCache>
+            </c:strRef>
+          </c:tx>
+          <c:spPr>
+            <a:solidFill>
+              <a:schemeClr val="accent1"/>
+            </a:solidFill>
+            <a:ln>
+              <a:noFill/>
+            </a:ln>
+            <a:effectLst/>
+          </c:spPr>
+          <c:invertIfNegative val="0"/>
+          <c:cat>
+            <c:strRef>
+              <c:f>Sheet1!$A$2:$A$4</c:f>
+              <c:strCache>
+                <c:ptCount val="3"/>
+                <c:pt idx="0">
+                  <c:v>Model 1</c:v>
+                </c:pt>
+                <c:pt idx="1">
+                  <c:v>Model 2</c:v>
+                </c:pt>
+                <c:pt idx="2">
+                  <c:v>Model 3</c:v>
+                </c:pt>
+              </c:strCache>
+            </c:strRef>
+          </c:cat>
+          <c:val>
+            <c:numRef>
+              <c:f>Sheet1!$B$2:$B$4</c:f>
+              <c:numCache>
+                <c:formatCode>General</c:formatCode>
+                <c:ptCount val="3"/>
+                <c:pt idx="0">
+                  <c:v>630000</c:v>
+                </c:pt>
+                <c:pt idx="1">
+                  <c:v>630000</c:v>
+                </c:pt>
+                <c:pt idx="2">
+                  <c:v>10400000</c:v>
+                </c:pt>
+              </c:numCache>
+            </c:numRef>
+          </c:val>
+          <c:extLst>
+            <c:ext xmlns:c16="http://schemas.microsoft.com/office/drawing/2014/chart" uri="{C3380CC4-5D6E-409C-BE32-E72D297353CC}">
+              <c16:uniqueId val="{00000000-B66E-4173-801E-1A502380C25E}"/>
+            </c:ext>
+          </c:extLst>
+        </c:ser>
+        <c:ser>
+          <c:idx val="1"/>
+          <c:order val="1"/>
+          <c:tx>
+            <c:strRef>
+              <c:f>Sheet1!$C$1</c:f>
+              <c:strCache>
+                <c:ptCount val="1"/>
+                <c:pt idx="0">
+                  <c:v>Predictions</c:v>
+                </c:pt>
+              </c:strCache>
+            </c:strRef>
+          </c:tx>
+          <c:spPr>
+            <a:solidFill>
+              <a:schemeClr val="accent2"/>
+            </a:solidFill>
+            <a:ln>
+              <a:noFill/>
+            </a:ln>
+            <a:effectLst/>
+          </c:spPr>
+          <c:invertIfNegative val="0"/>
+          <c:cat>
+            <c:strRef>
+              <c:f>Sheet1!$A$2:$A$4</c:f>
+              <c:strCache>
+                <c:ptCount val="3"/>
+                <c:pt idx="0">
+                  <c:v>Model 1</c:v>
+                </c:pt>
+                <c:pt idx="1">
+                  <c:v>Model 2</c:v>
+                </c:pt>
+                <c:pt idx="2">
+                  <c:v>Model 3</c:v>
+                </c:pt>
+              </c:strCache>
+            </c:strRef>
+          </c:cat>
+          <c:val>
+            <c:numRef>
+              <c:f>Sheet1!$C$2:$C$4</c:f>
+              <c:numCache>
+                <c:formatCode>General</c:formatCode>
+                <c:ptCount val="3"/>
+                <c:pt idx="0">
+                  <c:v>418000</c:v>
+                </c:pt>
+                <c:pt idx="1">
+                  <c:v>517000</c:v>
+                </c:pt>
+                <c:pt idx="2">
+                  <c:v>13100000</c:v>
+                </c:pt>
+              </c:numCache>
+            </c:numRef>
+          </c:val>
+          <c:extLst>
+            <c:ext xmlns:c16="http://schemas.microsoft.com/office/drawing/2014/chart" uri="{C3380CC4-5D6E-409C-BE32-E72D297353CC}">
+              <c16:uniqueId val="{00000001-B66E-4173-801E-1A502380C25E}"/>
+            </c:ext>
+          </c:extLst>
+        </c:ser>
+        <c:dLbls>
+          <c:showLegendKey val="0"/>
+          <c:showVal val="0"/>
+          <c:showCatName val="0"/>
+          <c:showSerName val="0"/>
+          <c:showPercent val="0"/>
+          <c:showBubbleSize val="0"/>
+        </c:dLbls>
+        <c:gapWidth val="219"/>
+        <c:overlap val="-27"/>
+        <c:axId val="821368800"/>
+        <c:axId val="821371320"/>
+      </c:barChart>
+      <c:catAx>
+        <c:axId val="821368800"/>
+        <c:scaling>
+          <c:orientation val="minMax"/>
+        </c:scaling>
+        <c:delete val="0"/>
+        <c:axPos val="b"/>
+        <c:numFmt formatCode="General" sourceLinked="1"/>
+        <c:majorTickMark val="none"/>
+        <c:minorTickMark val="none"/>
+        <c:tickLblPos val="nextTo"/>
+        <c:spPr>
+          <a:noFill/>
+          <a:ln w="9525" cap="flat" cmpd="sng" algn="ctr">
+            <a:solidFill>
+              <a:schemeClr val="tx1">
+                <a:lumMod val="15000"/>
+                <a:lumOff val="85000"/>
+              </a:schemeClr>
+            </a:solidFill>
+            <a:round/>
+          </a:ln>
+          <a:effectLst/>
+        </c:spPr>
+        <c:txPr>
+          <a:bodyPr rot="-60000000" spcFirstLastPara="1" vertOverflow="ellipsis" vert="horz" wrap="square" anchor="ctr" anchorCtr="1"/>
+          <a:lstStyle/>
+          <a:p>
+            <a:pPr>
+              <a:defRPr sz="1200" b="0" i="0" u="none" strike="noStrike" kern="1200" baseline="0">
+                <a:solidFill>
+                  <a:schemeClr val="tx1">
+                    <a:lumMod val="65000"/>
+                    <a:lumOff val="35000"/>
+                  </a:schemeClr>
+                </a:solidFill>
+                <a:latin typeface="+mn-lt"/>
+                <a:ea typeface="+mn-ea"/>
+                <a:cs typeface="+mn-cs"/>
+              </a:defRPr>
+            </a:pPr>
+            <a:endParaRPr lang="en-US"/>
+          </a:p>
+        </c:txPr>
+        <c:crossAx val="821371320"/>
+        <c:crosses val="autoZero"/>
+        <c:auto val="1"/>
+        <c:lblAlgn val="ctr"/>
+        <c:lblOffset val="100"/>
+        <c:noMultiLvlLbl val="0"/>
+      </c:catAx>
+      <c:valAx>
+        <c:axId val="821371320"/>
+        <c:scaling>
+          <c:orientation val="minMax"/>
+        </c:scaling>
+        <c:delete val="0"/>
+        <c:axPos val="l"/>
+        <c:majorGridlines>
+          <c:spPr>
+            <a:ln w="9525" cap="flat" cmpd="sng" algn="ctr">
+              <a:solidFill>
+                <a:schemeClr val="tx1">
+                  <a:lumMod val="15000"/>
+                  <a:lumOff val="85000"/>
+                </a:schemeClr>
+              </a:solidFill>
+              <a:round/>
+            </a:ln>
+            <a:effectLst/>
+          </c:spPr>
+        </c:majorGridlines>
+        <c:numFmt formatCode="General" sourceLinked="1"/>
+        <c:majorTickMark val="none"/>
+        <c:minorTickMark val="none"/>
+        <c:tickLblPos val="nextTo"/>
+        <c:spPr>
+          <a:noFill/>
+          <a:ln>
+            <a:noFill/>
+          </a:ln>
+          <a:effectLst/>
+        </c:spPr>
+        <c:txPr>
+          <a:bodyPr rot="-60000000" spcFirstLastPara="1" vertOverflow="ellipsis" vert="horz" wrap="square" anchor="ctr" anchorCtr="1"/>
+          <a:lstStyle/>
+          <a:p>
+            <a:pPr>
+              <a:defRPr sz="1200" b="0" i="0" u="none" strike="noStrike" kern="1200" baseline="0">
+                <a:solidFill>
+                  <a:schemeClr val="tx1">
+                    <a:lumMod val="65000"/>
+                    <a:lumOff val="35000"/>
+                  </a:schemeClr>
+                </a:solidFill>
+                <a:latin typeface="+mn-lt"/>
+                <a:ea typeface="+mn-ea"/>
+                <a:cs typeface="+mn-cs"/>
+              </a:defRPr>
+            </a:pPr>
+            <a:endParaRPr lang="en-US"/>
+          </a:p>
+        </c:txPr>
+        <c:crossAx val="821368800"/>
+        <c:crosses val="autoZero"/>
+        <c:crossBetween val="between"/>
+      </c:valAx>
+      <c:spPr>
+        <a:noFill/>
+        <a:ln>
+          <a:noFill/>
+        </a:ln>
+        <a:effectLst/>
+      </c:spPr>
+    </c:plotArea>
+    <c:legend>
+      <c:legendPos val="b"/>
+      <c:overlay val="0"/>
+      <c:spPr>
+        <a:noFill/>
+        <a:ln>
+          <a:noFill/>
+        </a:ln>
+        <a:effectLst/>
+      </c:spPr>
+      <c:txPr>
+        <a:bodyPr rot="0" spcFirstLastPara="1" vertOverflow="ellipsis" vert="horz" wrap="square" anchor="ctr" anchorCtr="1"/>
+        <a:lstStyle/>
+        <a:p>
+          <a:pPr>
+            <a:defRPr sz="1200" b="0" i="0" u="none" strike="noStrike" kern="1200" baseline="0">
+              <a:solidFill>
+                <a:schemeClr val="tx1">
+                  <a:lumMod val="65000"/>
+                  <a:lumOff val="35000"/>
+                </a:schemeClr>
+              </a:solidFill>
+              <a:latin typeface="+mn-lt"/>
+              <a:ea typeface="+mn-ea"/>
+              <a:cs typeface="+mn-cs"/>
+            </a:defRPr>
+          </a:pPr>
+          <a:endParaRPr lang="en-US"/>
+        </a:p>
+      </c:txPr>
+    </c:legend>
+    <c:plotVisOnly val="1"/>
+    <c:dispBlanksAs val="gap"/>
+    <c:extLst>
+      <c:ext xmlns:c16r3="http://schemas.microsoft.com/office/drawing/2017/03/chart" uri="{56B9EC1D-385E-4148-901F-78D8002777C0}">
+        <c16r3:dataDisplayOptions16>
+          <c16r3:dispNaAsBlank val="1"/>
+        </c16r3:dataDisplayOptions16>
+      </c:ext>
+    </c:extLst>
+    <c:showDLblsOverMax val="0"/>
+  </c:chart>
+  <c:spPr>
+    <a:noFill/>
+    <a:ln>
+      <a:noFill/>
+    </a:ln>
+    <a:effectLst/>
+  </c:spPr>
+  <c:txPr>
+    <a:bodyPr/>
+    <a:lstStyle/>
+    <a:p>
+      <a:pPr>
+        <a:defRPr sz="1200"/>
+      </a:pPr>
+      <a:endParaRPr lang="en-US"/>
+    </a:p>
+  </c:txPr>
+  <c:externalData r:id="rId3">
+    <c:autoUpdate val="0"/>
+  </c:externalData>
+</c:chartSpace>
+</file>
+
+<file path=ppt/charts/colors1.xml><?xml version="1.0" encoding="utf-8"?>
+<cs:colorStyle xmlns:cs="http://schemas.microsoft.com/office/drawing/2012/chartStyle" xmlns:a="http://schemas.openxmlformats.org/drawingml/2006/main" meth="cycle" id="10">
+  <a:schemeClr val="accent1"/>
+  <a:schemeClr val="accent2"/>
+  <a:schemeClr val="accent3"/>
+  <a:schemeClr val="accent4"/>
+  <a:schemeClr val="accent5"/>
+  <a:schemeClr val="accent6"/>
+  <cs:variation/>
+  <cs:variation>
+    <a:lumMod val="60000"/>
+  </cs:variation>
+  <cs:variation>
+    <a:lumMod val="80000"/>
+    <a:lumOff val="20000"/>
+  </cs:variation>
+  <cs:variation>
+    <a:lumMod val="80000"/>
+  </cs:variation>
+  <cs:variation>
+    <a:lumMod val="60000"/>
+    <a:lumOff val="40000"/>
+  </cs:variation>
+  <cs:variation>
+    <a:lumMod val="50000"/>
+  </cs:variation>
+  <cs:variation>
+    <a:lumMod val="70000"/>
+    <a:lumOff val="30000"/>
+  </cs:variation>
+  <cs:variation>
+    <a:lumMod val="70000"/>
+  </cs:variation>
+  <cs:variation>
+    <a:lumMod val="50000"/>
+    <a:lumOff val="50000"/>
+  </cs:variation>
+</cs:colorStyle>
+</file>
+
+<file path=ppt/charts/style1.xml><?xml version="1.0" encoding="utf-8"?>
+<cs:chartStyle xmlns:cs="http://schemas.microsoft.com/office/drawing/2012/chartStyle" xmlns:a="http://schemas.openxmlformats.org/drawingml/2006/main" id="201">
+  <cs:axisTitle>
+    <cs:lnRef idx="0"/>
+    <cs:fillRef idx="0"/>
+    <cs:effectRef idx="0"/>
+    <cs:fontRef idx="minor">
+      <a:schemeClr val="tx1">
+        <a:lumMod val="65000"/>
+        <a:lumOff val="35000"/>
+      </a:schemeClr>
+    </cs:fontRef>
+    <cs:defRPr sz="1330" kern="1200"/>
+  </cs:axisTitle>
+  <cs:categoryAxis>
+    <cs:lnRef idx="0"/>
+    <cs:fillRef idx="0"/>
+    <cs:effectRef idx="0"/>
+    <cs:fontRef idx="minor">
+      <a:schemeClr val="tx1">
+        <a:lumMod val="65000"/>
+        <a:lumOff val="35000"/>
+      </a:schemeClr>
+    </cs:fontRef>
+    <cs:spPr>
+      <a:ln w="9525" cap="flat" cmpd="sng" algn="ctr">
+        <a:solidFill>
+          <a:schemeClr val="tx1">
+            <a:lumMod val="15000"/>
+            <a:lumOff val="85000"/>
+          </a:schemeClr>
+        </a:solidFill>
+        <a:round/>
+      </a:ln>
+    </cs:spPr>
+    <cs:defRPr sz="1197" kern="1200"/>
+  </cs:categoryAxis>
+  <cs:chartArea mods="allowNoFillOverride allowNoLineOverride">
+    <cs:lnRef idx="0"/>
+    <cs:fillRef idx="0"/>
+    <cs:effectRef idx="0"/>
+    <cs:fontRef idx="minor">
+      <a:schemeClr val="tx1"/>
+    </cs:fontRef>
+    <cs:spPr>
+      <a:solidFill>
+        <a:schemeClr val="bg1"/>
+      </a:solidFill>
+      <a:ln w="9525" cap="flat" cmpd="sng" algn="ctr">
+        <a:solidFill>
+          <a:schemeClr val="tx1">
+            <a:lumMod val="15000"/>
+            <a:lumOff val="85000"/>
+          </a:schemeClr>
+        </a:solidFill>
+        <a:round/>
+      </a:ln>
+    </cs:spPr>
+    <cs:defRPr sz="1330" kern="1200"/>
+  </cs:chartArea>
+  <cs:dataLabel>
+    <cs:lnRef idx="0"/>
+    <cs:fillRef idx="0"/>
+    <cs:effectRef idx="0"/>
+    <cs:fontRef idx="minor">
+      <a:schemeClr val="tx1">
+        <a:lumMod val="75000"/>
+        <a:lumOff val="25000"/>
+      </a:schemeClr>
+    </cs:fontRef>
+    <cs:defRPr sz="1197" kern="1200"/>
+  </cs:dataLabel>
+  <cs:dataLabelCallout>
+    <cs:lnRef idx="0"/>
+    <cs:fillRef idx="0"/>
+    <cs:effectRef idx="0"/>
+    <cs:fontRef idx="minor">
+      <a:schemeClr val="dk1">
+        <a:lumMod val="65000"/>
+        <a:lumOff val="35000"/>
+      </a:schemeClr>
+    </cs:fontRef>
+    <cs:spPr>
+      <a:solidFill>
+        <a:schemeClr val="lt1"/>
+      </a:solidFill>
+      <a:ln>
+        <a:solidFill>
+          <a:schemeClr val="dk1">
+            <a:lumMod val="25000"/>
+            <a:lumOff val="75000"/>
+          </a:schemeClr>
+        </a:solidFill>
+      </a:ln>
+    </cs:spPr>
+    <cs:defRPr sz="1197" kern="1200"/>
+    <cs:bodyPr rot="0" spcFirstLastPara="1" vertOverflow="clip" horzOverflow="clip" vert="horz" wrap="square" lIns="36576" tIns="18288" rIns="36576" bIns="18288" anchor="ctr" anchorCtr="1">
+      <a:spAutoFit/>
+    </cs:bodyPr>
+  </cs:dataLabelCallout>
+  <cs:dataPoint>
+    <cs:lnRef idx="0"/>
+    <cs:fillRef idx="1">
+      <cs:styleClr val="auto"/>
+    </cs:fillRef>
+    <cs:effectRef idx="0"/>
+    <cs:fontRef idx="minor">
+      <a:schemeClr val="tx1"/>
+    </cs:fontRef>
+  </cs:dataPoint>
+  <cs:dataPoint3D>
+    <cs:lnRef idx="0"/>
+    <cs:fillRef idx="1">
+      <cs:styleClr val="auto"/>
+    </cs:fillRef>
+    <cs:effectRef idx="0"/>
+    <cs:fontRef idx="minor">
+      <a:schemeClr val="tx1"/>
+    </cs:fontRef>
+  </cs:dataPoint3D>
+  <cs:dataPointLine>
+    <cs:lnRef idx="0">
+      <cs:styleClr val="auto"/>
+    </cs:lnRef>
+    <cs:fillRef idx="1"/>
+    <cs:effectRef idx="0"/>
+    <cs:fontRef idx="minor">
+      <a:schemeClr val="tx1"/>
+    </cs:fontRef>
+    <cs:spPr>
+      <a:ln w="28575" cap="rnd">
+        <a:solidFill>
+          <a:schemeClr val="phClr"/>
+        </a:solidFill>
+        <a:round/>
+      </a:ln>
+    </cs:spPr>
+  </cs:dataPointLine>
+  <cs:dataPointMarker>
+    <cs:lnRef idx="0">
+      <cs:styleClr val="auto"/>
+    </cs:lnRef>
+    <cs:fillRef idx="1">
+      <cs:styleClr val="auto"/>
+    </cs:fillRef>
+    <cs:effectRef idx="0"/>
+    <cs:fontRef idx="minor">
+      <a:schemeClr val="tx1"/>
+    </cs:fontRef>
+    <cs:spPr>
+      <a:ln w="9525">
+        <a:solidFill>
+          <a:schemeClr val="phClr"/>
+        </a:solidFill>
+      </a:ln>
+    </cs:spPr>
+  </cs:dataPointMarker>
+  <cs:dataPointMarkerLayout symbol="circle" size="5"/>
+  <cs:dataPointWireframe>
+    <cs:lnRef idx="0">
+      <cs:styleClr val="auto"/>
+    </cs:lnRef>
+    <cs:fillRef idx="1"/>
+    <cs:effectRef idx="0"/>
+    <cs:fontRef idx="minor">
+      <a:schemeClr val="tx1"/>
+    </cs:fontRef>
+    <cs:spPr>
+      <a:ln w="9525" cap="rnd">
+        <a:solidFill>
+          <a:schemeClr val="phClr"/>
+        </a:solidFill>
+        <a:round/>
+      </a:ln>
+    </cs:spPr>
+  </cs:dataPointWireframe>
+  <cs:dataTable>
+    <cs:lnRef idx="0"/>
+    <cs:fillRef idx="0"/>
+    <cs:effectRef idx="0"/>
+    <cs:fontRef idx="minor">
+      <a:schemeClr val="tx1">
+        <a:lumMod val="65000"/>
+        <a:lumOff val="35000"/>
+      </a:schemeClr>
+    </cs:fontRef>
+    <cs:spPr>
+      <a:noFill/>
+      <a:ln w="9525" cap="flat" cmpd="sng" algn="ctr">
+        <a:solidFill>
+          <a:schemeClr val="tx1">
+            <a:lumMod val="15000"/>
+            <a:lumOff val="85000"/>
+          </a:schemeClr>
+        </a:solidFill>
+        <a:round/>
+      </a:ln>
+    </cs:spPr>
+    <cs:defRPr sz="1197" kern="1200"/>
+  </cs:dataTable>
+  <cs:downBar>
+    <cs:lnRef idx="0"/>
+    <cs:fillRef idx="0"/>
+    <cs:effectRef idx="0"/>
+    <cs:fontRef idx="minor">
+      <a:schemeClr val="dk1"/>
+    </cs:fontRef>
+    <cs:spPr>
+      <a:solidFill>
+        <a:schemeClr val="dk1">
+          <a:lumMod val="65000"/>
+          <a:lumOff val="35000"/>
+        </a:schemeClr>
+      </a:solidFill>
+      <a:ln w="9525">
+        <a:solidFill>
+          <a:schemeClr val="tx1">
+            <a:lumMod val="65000"/>
+            <a:lumOff val="35000"/>
+          </a:schemeClr>
+        </a:solidFill>
+      </a:ln>
+    </cs:spPr>
+  </cs:downBar>
+  <cs:dropLine>
+    <cs:lnRef idx="0"/>
+    <cs:fillRef idx="0"/>
+    <cs:effectRef idx="0"/>
+    <cs:fontRef idx="minor">
+      <a:schemeClr val="tx1"/>
+    </cs:fontRef>
+    <cs:spPr>
+      <a:ln w="9525" cap="flat" cmpd="sng" algn="ctr">
+        <a:solidFill>
+          <a:schemeClr val="tx1">
+            <a:lumMod val="35000"/>
+            <a:lumOff val="65000"/>
+          </a:schemeClr>
+        </a:solidFill>
+        <a:round/>
+      </a:ln>
+    </cs:spPr>
+  </cs:dropLine>
+  <cs:errorBar>
+    <cs:lnRef idx="0"/>
+    <cs:fillRef idx="0"/>
+    <cs:effectRef idx="0"/>
+    <cs:fontRef idx="minor">
+      <a:schemeClr val="tx1"/>
+    </cs:fontRef>
+    <cs:spPr>
+      <a:ln w="9525" cap="flat" cmpd="sng" algn="ctr">
+        <a:solidFill>
+          <a:schemeClr val="tx1">
+            <a:lumMod val="65000"/>
+            <a:lumOff val="35000"/>
+          </a:schemeClr>
+        </a:solidFill>
+        <a:round/>
+      </a:ln>
+    </cs:spPr>
+  </cs:errorBar>
+  <cs:floor>
+    <cs:lnRef idx="0"/>
+    <cs:fillRef idx="0"/>
+    <cs:effectRef idx="0"/>
+    <cs:fontRef idx="minor">
+      <a:schemeClr val="tx1"/>
+    </cs:fontRef>
+    <cs:spPr>
+      <a:noFill/>
+      <a:ln>
+        <a:noFill/>
+      </a:ln>
+    </cs:spPr>
+  </cs:floor>
+  <cs:gridlineMajor>
+    <cs:lnRef idx="0"/>
+    <cs:fillRef idx="0"/>
+    <cs:effectRef idx="0"/>
+    <cs:fontRef idx="minor">
+      <a:schemeClr val="tx1"/>
+    </cs:fontRef>
+    <cs:spPr>
+      <a:ln w="9525" cap="flat" cmpd="sng" algn="ctr">
+        <a:solidFill>
+          <a:schemeClr val="tx1">
+            <a:lumMod val="15000"/>
+            <a:lumOff val="85000"/>
+          </a:schemeClr>
+        </a:solidFill>
+        <a:round/>
+      </a:ln>
+    </cs:spPr>
+  </cs:gridlineMajor>
+  <cs:gridlineMinor>
+    <cs:lnRef idx="0"/>
+    <cs:fillRef idx="0"/>
+    <cs:effectRef idx="0"/>
+    <cs:fontRef idx="minor">
+      <a:schemeClr val="tx1"/>
+    </cs:fontRef>
+    <cs:spPr>
+      <a:ln w="9525" cap="flat" cmpd="sng" algn="ctr">
+        <a:solidFill>
+          <a:schemeClr val="tx1">
+            <a:lumMod val="5000"/>
+            <a:lumOff val="95000"/>
+          </a:schemeClr>
+        </a:solidFill>
+        <a:round/>
+      </a:ln>
+    </cs:spPr>
+  </cs:gridlineMinor>
+  <cs:hiLoLine>
+    <cs:lnRef idx="0"/>
+    <cs:fillRef idx="0"/>
+    <cs:effectRef idx="0"/>
+    <cs:fontRef idx="minor">
+      <a:schemeClr val="tx1"/>
+    </cs:fontRef>
+    <cs:spPr>
+      <a:ln w="9525" cap="flat" cmpd="sng" algn="ctr">
+        <a:solidFill>
+          <a:schemeClr val="tx1">
+            <a:lumMod val="75000"/>
+            <a:lumOff val="25000"/>
+          </a:schemeClr>
+        </a:solidFill>
+        <a:round/>
+      </a:ln>
+    </cs:spPr>
+  </cs:hiLoLine>
+  <cs:leaderLine>
+    <cs:lnRef idx="0"/>
+    <cs:fillRef idx="0"/>
+    <cs:effectRef idx="0"/>
+    <cs:fontRef idx="minor">
+      <a:schemeClr val="tx1"/>
+    </cs:fontRef>
+    <cs:spPr>
+      <a:ln w="9525" cap="flat" cmpd="sng" algn="ctr">
+        <a:solidFill>
+          <a:schemeClr val="tx1">
+            <a:lumMod val="35000"/>
+            <a:lumOff val="65000"/>
+          </a:schemeClr>
+        </a:solidFill>
+        <a:round/>
+      </a:ln>
+    </cs:spPr>
+  </cs:leaderLine>
+  <cs:legend>
+    <cs:lnRef idx="0"/>
+    <cs:fillRef idx="0"/>
+    <cs:effectRef idx="0"/>
+    <cs:fontRef idx="minor">
+      <a:schemeClr val="tx1">
+        <a:lumMod val="65000"/>
+        <a:lumOff val="35000"/>
+      </a:schemeClr>
+    </cs:fontRef>
+    <cs:defRPr sz="1197" kern="1200"/>
+  </cs:legend>
+  <cs:plotArea mods="allowNoFillOverride allowNoLineOverride">
+    <cs:lnRef idx="0"/>
+    <cs:fillRef idx="0"/>
+    <cs:effectRef idx="0"/>
+    <cs:fontRef idx="minor">
+      <a:schemeClr val="tx1"/>
+    </cs:fontRef>
+  </cs:plotArea>
+  <cs:plotArea3D mods="allowNoFillOverride allowNoLineOverride">
+    <cs:lnRef idx="0"/>
+    <cs:fillRef idx="0"/>
+    <cs:effectRef idx="0"/>
+    <cs:fontRef idx="minor">
+      <a:schemeClr val="tx1"/>
+    </cs:fontRef>
+  </cs:plotArea3D>
+  <cs:seriesAxis>
+    <cs:lnRef idx="0"/>
+    <cs:fillRef idx="0"/>
+    <cs:effectRef idx="0"/>
+    <cs:fontRef idx="minor">
+      <a:schemeClr val="tx1">
+        <a:lumMod val="65000"/>
+        <a:lumOff val="35000"/>
+      </a:schemeClr>
+    </cs:fontRef>
+    <cs:defRPr sz="1197" kern="1200"/>
+  </cs:seriesAxis>
+  <cs:seriesLine>
+    <cs:lnRef idx="0"/>
+    <cs:fillRef idx="0"/>
+    <cs:effectRef idx="0"/>
+    <cs:fontRef idx="minor">
+      <a:schemeClr val="tx1"/>
+    </cs:fontRef>
+    <cs:spPr>
+      <a:ln w="9525" cap="flat" cmpd="sng" algn="ctr">
+        <a:solidFill>
+          <a:schemeClr val="tx1">
+            <a:lumMod val="35000"/>
+            <a:lumOff val="65000"/>
+          </a:schemeClr>
+        </a:solidFill>
+        <a:round/>
+      </a:ln>
+    </cs:spPr>
+  </cs:seriesLine>
+  <cs:title>
+    <cs:lnRef idx="0"/>
+    <cs:fillRef idx="0"/>
+    <cs:effectRef idx="0"/>
+    <cs:fontRef idx="minor">
+      <a:schemeClr val="tx1">
+        <a:lumMod val="65000"/>
+        <a:lumOff val="35000"/>
+      </a:schemeClr>
+    </cs:fontRef>
+    <cs:defRPr sz="1862" b="0" kern="1200" spc="0" baseline="0"/>
+  </cs:title>
+  <cs:trendline>
+    <cs:lnRef idx="0">
+      <cs:styleClr val="auto"/>
+    </cs:lnRef>
+    <cs:fillRef idx="0"/>
+    <cs:effectRef idx="0"/>
+    <cs:fontRef idx="minor">
+      <a:schemeClr val="tx1"/>
+    </cs:fontRef>
+    <cs:spPr>
+      <a:ln w="19050" cap="rnd">
+        <a:solidFill>
+          <a:schemeClr val="phClr"/>
+        </a:solidFill>
+        <a:prstDash val="sysDot"/>
+      </a:ln>
+    </cs:spPr>
+  </cs:trendline>
+  <cs:trendlineLabel>
+    <cs:lnRef idx="0"/>
+    <cs:fillRef idx="0"/>
+    <cs:effectRef idx="0"/>
+    <cs:fontRef idx="minor">
+      <a:schemeClr val="tx1">
+        <a:lumMod val="65000"/>
+        <a:lumOff val="35000"/>
+      </a:schemeClr>
+    </cs:fontRef>
+    <cs:defRPr sz="1197" kern="1200"/>
+  </cs:trendlineLabel>
+  <cs:upBar>
+    <cs:lnRef idx="0"/>
+    <cs:fillRef idx="0"/>
+    <cs:effectRef idx="0"/>
+    <cs:fontRef idx="minor">
+      <a:schemeClr val="dk1"/>
+    </cs:fontRef>
+    <cs:spPr>
+      <a:solidFill>
+        <a:schemeClr val="lt1"/>
+      </a:solidFill>
+      <a:ln w="9525">
+        <a:solidFill>
+          <a:schemeClr val="tx1">
+            <a:lumMod val="15000"/>
+            <a:lumOff val="85000"/>
+          </a:schemeClr>
+        </a:solidFill>
+      </a:ln>
+    </cs:spPr>
+  </cs:upBar>
+  <cs:valueAxis>
+    <cs:lnRef idx="0"/>
+    <cs:fillRef idx="0"/>
+    <cs:effectRef idx="0"/>
+    <cs:fontRef idx="minor">
+      <a:schemeClr val="tx1">
+        <a:lumMod val="65000"/>
+        <a:lumOff val="35000"/>
+      </a:schemeClr>
+    </cs:fontRef>
+    <cs:defRPr sz="1197" kern="1200"/>
+  </cs:valueAxis>
+  <cs:wall>
+    <cs:lnRef idx="0"/>
+    <cs:fillRef idx="0"/>
+    <cs:effectRef idx="0"/>
+    <cs:fontRef idx="minor">
+      <a:schemeClr val="tx1"/>
+    </cs:fontRef>
+    <cs:spPr>
+      <a:noFill/>
+      <a:ln>
+        <a:noFill/>
+      </a:ln>
+    </cs:spPr>
+  </cs:wall>
+</cs:chartStyle>
+</file>
+
 <file path=ppt/handoutMasters/handoutMaster1.xml><?xml version="1.0" encoding="utf-8"?>
 <p:handoutMaster xmlns:a="http://schemas.openxmlformats.org/drawingml/2006/main" xmlns:r="http://schemas.openxmlformats.org/officeDocument/2006/relationships" xmlns:p="http://schemas.openxmlformats.org/presentationml/2006/main">
   <p:cSld>
@@ -214,7 +1296,7 @@
             <a:pPr rtl="0"/>
             <a:fld id="{F35A8005-E8BE-4544-AED3-7636CBB26C99}" type="datetime1">
               <a:rPr lang="en-GB" smtClean="0"/>
-              <a:t>24/11/2024</a:t>
+              <a:t>25/11/2024</a:t>
             </a:fld>
             <a:endParaRPr lang="en-GB"/>
           </a:p>
@@ -384,7 +1466,7 @@
             <a:pPr rtl="0"/>
             <a:fld id="{B9280ED7-62B9-4A6D-82D7-4670C6C29CB4}" type="datetime1">
               <a:rPr lang="en-GB" noProof="0" smtClean="0"/>
-              <a:t>24/11/2024</a:t>
+              <a:t>25/11/2024</a:t>
             </a:fld>
             <a:endParaRPr lang="en-GB" noProof="0"/>
           </a:p>
@@ -736,6 +1818,44 @@
             <a:pPr rtl="0"/>
             <a:endParaRPr lang="en-GB" dirty="0"/>
           </a:p>
+          <a:p>
+            <a:pPr marL="171450" indent="-171450" rtl="0">
+              <a:buFont typeface="Arial" panose="020B0604020202020204" pitchFamily="34" charset="0"/>
+              <a:buChar char="•"/>
+            </a:pPr>
+            <a:r>
+              <a:rPr lang="en-GB" dirty="0"/>
+              <a:t>Welcome, this project is on estimating retail turnover using geospatial and open-source data.</a:t>
+            </a:r>
+          </a:p>
+          <a:p>
+            <a:pPr marL="171450" indent="-171450" rtl="0">
+              <a:buFont typeface="Arial" panose="020B0604020202020204" pitchFamily="34" charset="0"/>
+              <a:buChar char="•"/>
+            </a:pPr>
+            <a:r>
+              <a:rPr lang="en-GB" dirty="0"/>
+              <a:t>This submission is part of the </a:t>
+            </a:r>
+            <a:r>
+              <a:rPr lang="en-GB" dirty="0" err="1"/>
+              <a:t>GeoTam</a:t>
+            </a:r>
+            <a:r>
+              <a:rPr lang="en-GB" dirty="0"/>
+              <a:t> Challenge 2024 and focuses on developing a methodology for assessing business revenue in the Greater Manchester region.</a:t>
+            </a:r>
+          </a:p>
+          <a:p>
+            <a:pPr marL="171450" indent="-171450" rtl="0">
+              <a:buFont typeface="Arial" panose="020B0604020202020204" pitchFamily="34" charset="0"/>
+              <a:buChar char="•"/>
+            </a:pPr>
+            <a:r>
+              <a:rPr lang="en-GB" dirty="0"/>
+              <a:t>Let’s explore the objectives, challenges, methodology, and results of this project.</a:t>
+            </a:r>
+          </a:p>
         </p:txBody>
       </p:sp>
       <p:sp>
@@ -767,6 +1887,173 @@
     <p:extLst>
       <p:ext uri="{BB962C8B-B14F-4D97-AF65-F5344CB8AC3E}">
         <p14:creationId xmlns:p14="http://schemas.microsoft.com/office/powerpoint/2010/main" val="98792612"/>
+      </p:ext>
+    </p:extLst>
+  </p:cSld>
+  <p:clrMapOvr>
+    <a:masterClrMapping/>
+  </p:clrMapOvr>
+</p:notes>
+</file>
+
+<file path=ppt/notesSlides/notesSlide10.xml><?xml version="1.0" encoding="utf-8"?>
+<p:notes xmlns:a="http://schemas.openxmlformats.org/drawingml/2006/main" xmlns:r="http://schemas.openxmlformats.org/officeDocument/2006/relationships" xmlns:p="http://schemas.openxmlformats.org/presentationml/2006/main">
+  <p:cSld>
+    <p:spTree>
+      <p:nvGrpSpPr>
+        <p:cNvPr id="1" name=""/>
+        <p:cNvGrpSpPr/>
+        <p:nvPr/>
+      </p:nvGrpSpPr>
+      <p:grpSpPr>
+        <a:xfrm>
+          <a:off x="0" y="0"/>
+          <a:ext cx="0" cy="0"/>
+          <a:chOff x="0" y="0"/>
+          <a:chExt cx="0" cy="0"/>
+        </a:xfrm>
+      </p:grpSpPr>
+      <p:sp>
+        <p:nvSpPr>
+          <p:cNvPr id="2" name="Slide Image Placeholder 1"/>
+          <p:cNvSpPr>
+            <a:spLocks noGrp="1" noRot="1" noChangeAspect="1"/>
+          </p:cNvSpPr>
+          <p:nvPr>
+            <p:ph type="sldImg"/>
+          </p:nvPr>
+        </p:nvSpPr>
+        <p:spPr/>
+      </p:sp>
+      <p:sp>
+        <p:nvSpPr>
+          <p:cNvPr id="3" name="Notes Placeholder 2"/>
+          <p:cNvSpPr>
+            <a:spLocks noGrp="1"/>
+          </p:cNvSpPr>
+          <p:nvPr>
+            <p:ph type="body" idx="1"/>
+          </p:nvPr>
+        </p:nvSpPr>
+        <p:spPr/>
+        <p:txBody>
+          <a:bodyPr/>
+          <a:lstStyle/>
+          <a:p>
+            <a:pPr marL="171450" indent="-171450">
+              <a:buFont typeface="Arial" panose="020B0604020202020204" pitchFamily="34" charset="0"/>
+              <a:buChar char="•"/>
+            </a:pPr>
+            <a:r>
+              <a:rPr lang="en-GB" b="1" dirty="0"/>
+              <a:t>Key Takeaways</a:t>
+            </a:r>
+            <a:r>
+              <a:rPr lang="en-GB" dirty="0"/>
+              <a:t>:</a:t>
+            </a:r>
+          </a:p>
+          <a:p>
+            <a:pPr marL="628650" lvl="1" indent="-171450">
+              <a:buFont typeface="Arial" panose="020B0604020202020204" pitchFamily="34" charset="0"/>
+              <a:buChar char="•"/>
+            </a:pPr>
+            <a:r>
+              <a:rPr lang="en-GB" dirty="0"/>
+              <a:t>Estimating business turnover is feasible using open-source data and well-designed models.</a:t>
+            </a:r>
+          </a:p>
+          <a:p>
+            <a:pPr marL="628650" lvl="1" indent="-171450">
+              <a:buFont typeface="Arial" panose="020B0604020202020204" pitchFamily="34" charset="0"/>
+              <a:buChar char="•"/>
+            </a:pPr>
+            <a:r>
+              <a:rPr lang="en-GB" dirty="0"/>
+              <a:t>The methodology demonstrates a balance between simplicity and accuracy, making it scalable to other regions.</a:t>
+            </a:r>
+          </a:p>
+          <a:p>
+            <a:pPr marL="171450" indent="-171450">
+              <a:buFont typeface="Arial" panose="020B0604020202020204" pitchFamily="34" charset="0"/>
+              <a:buChar char="•"/>
+            </a:pPr>
+            <a:r>
+              <a:rPr lang="en-GB" b="1" dirty="0"/>
+              <a:t>Future Directions</a:t>
+            </a:r>
+            <a:r>
+              <a:rPr lang="en-GB" dirty="0"/>
+              <a:t>:</a:t>
+            </a:r>
+          </a:p>
+          <a:p>
+            <a:pPr marL="628650" lvl="1" indent="-171450">
+              <a:buFont typeface="Arial" panose="020B0604020202020204" pitchFamily="34" charset="0"/>
+              <a:buChar char="•"/>
+            </a:pPr>
+            <a:r>
+              <a:rPr lang="en-GB" dirty="0"/>
+              <a:t>Integrate real-time business data for more precise turnover estimates.</a:t>
+            </a:r>
+          </a:p>
+          <a:p>
+            <a:pPr marL="628650" lvl="1" indent="-171450">
+              <a:buFont typeface="Arial" panose="020B0604020202020204" pitchFamily="34" charset="0"/>
+              <a:buChar char="•"/>
+            </a:pPr>
+            <a:r>
+              <a:rPr lang="en-GB" dirty="0"/>
+              <a:t>Expand the model to cover additional regions and industries.</a:t>
+            </a:r>
+          </a:p>
+          <a:p>
+            <a:pPr marL="171450" indent="-171450">
+              <a:buFont typeface="Arial" panose="020B0604020202020204" pitchFamily="34" charset="0"/>
+              <a:buChar char="•"/>
+            </a:pPr>
+            <a:r>
+              <a:rPr lang="en-GB" dirty="0"/>
+              <a:t>Thank you for reviewing this presentation. We welcome your feedback!</a:t>
+            </a:r>
+          </a:p>
+          <a:p>
+            <a:pPr marL="171450" indent="-171450">
+              <a:buFont typeface="Arial" panose="020B0604020202020204" pitchFamily="34" charset="0"/>
+              <a:buChar char="•"/>
+            </a:pPr>
+            <a:endParaRPr lang="en-GB" dirty="0"/>
+          </a:p>
+        </p:txBody>
+      </p:sp>
+      <p:sp>
+        <p:nvSpPr>
+          <p:cNvPr id="4" name="Slide Number Placeholder 3"/>
+          <p:cNvSpPr>
+            <a:spLocks noGrp="1"/>
+          </p:cNvSpPr>
+          <p:nvPr>
+            <p:ph type="sldNum" sz="quarter" idx="5"/>
+          </p:nvPr>
+        </p:nvSpPr>
+        <p:spPr/>
+        <p:txBody>
+          <a:bodyPr/>
+          <a:lstStyle/>
+          <a:p>
+            <a:pPr rtl="0"/>
+            <a:fld id="{333E963C-1534-4F8D-B2A7-66D81AA25953}" type="slidenum">
+              <a:rPr lang="en-GB" noProof="0" smtClean="0"/>
+              <a:t>10</a:t>
+            </a:fld>
+            <a:endParaRPr lang="en-GB" noProof="0"/>
+          </a:p>
+        </p:txBody>
+      </p:sp>
+    </p:spTree>
+    <p:extLst>
+      <p:ext uri="{BB962C8B-B14F-4D97-AF65-F5344CB8AC3E}">
+        <p14:creationId xmlns:p14="http://schemas.microsoft.com/office/powerpoint/2010/main" val="1735382647"/>
       </p:ext>
     </p:extLst>
   </p:cSld>
@@ -822,8 +2109,72 @@
           </a:bodyPr>
           <a:lstStyle/>
           <a:p>
-            <a:pPr rtl="0"/>
-            <a:endParaRPr lang="en-GB"/>
+            <a:pPr marL="171450" indent="-171450">
+              <a:buFont typeface="Arial" panose="020B0604020202020204" pitchFamily="34" charset="0"/>
+              <a:buChar char="•"/>
+            </a:pPr>
+            <a:r>
+              <a:rPr lang="en-GB" b="1" dirty="0"/>
+              <a:t>Objective</a:t>
+            </a:r>
+            <a:r>
+              <a:rPr lang="en-GB" dirty="0"/>
+              <a:t>: </a:t>
+            </a:r>
+          </a:p>
+          <a:p>
+            <a:pPr marL="628650" lvl="1" indent="-171450">
+              <a:buFont typeface="Arial" panose="020B0604020202020204" pitchFamily="34" charset="0"/>
+              <a:buChar char="•"/>
+            </a:pPr>
+            <a:r>
+              <a:rPr lang="en-GB" dirty="0"/>
+              <a:t>The aim to estimate the turnover of businesses in Greater Manchester using available open-source datasets. The goal is to predict potential revenue loss for businesses in scenarios like flooding or other disruptions.</a:t>
+            </a:r>
+          </a:p>
+          <a:p>
+            <a:pPr marL="171450" indent="-171450">
+              <a:buFont typeface="Arial" panose="020B0604020202020204" pitchFamily="34" charset="0"/>
+              <a:buChar char="•"/>
+            </a:pPr>
+            <a:r>
+              <a:rPr lang="en-GB" b="1" dirty="0"/>
+              <a:t>Challenges</a:t>
+            </a:r>
+            <a:r>
+              <a:rPr lang="en-GB" dirty="0"/>
+              <a:t>:</a:t>
+            </a:r>
+          </a:p>
+          <a:p>
+            <a:pPr marL="628650" lvl="1" indent="-171450">
+              <a:buFont typeface="Arial" panose="020B0604020202020204" pitchFamily="34" charset="0"/>
+              <a:buChar char="•"/>
+            </a:pPr>
+            <a:r>
+              <a:rPr lang="en-GB" dirty="0"/>
+              <a:t>Many datasets lack complete information, such as missing rateable values and business names.</a:t>
+            </a:r>
+          </a:p>
+          <a:p>
+            <a:pPr marL="628650" lvl="1" indent="-171450">
+              <a:buFont typeface="Arial" panose="020B0604020202020204" pitchFamily="34" charset="0"/>
+              <a:buChar char="•"/>
+            </a:pPr>
+            <a:r>
+              <a:rPr lang="en-GB" dirty="0"/>
+              <a:t>There is no direct turnover data, requiring innovative methods to estimate it.</a:t>
+            </a:r>
+          </a:p>
+          <a:p>
+            <a:pPr marL="628650" lvl="1" indent="-171450">
+              <a:buFont typeface="Arial" panose="020B0604020202020204" pitchFamily="34" charset="0"/>
+              <a:buChar char="•"/>
+            </a:pPr>
+            <a:r>
+              <a:rPr lang="en-GB" dirty="0"/>
+              <a:t>Merging data from various sources is complex due to format inconsistencies.</a:t>
+            </a:r>
           </a:p>
         </p:txBody>
       </p:sp>
@@ -911,42 +2262,80 @@
           </a:bodyPr>
           <a:lstStyle/>
           <a:p>
-            <a:pPr>
+            <a:pPr marL="171450" indent="-171450">
               <a:buFont typeface="Arial" panose="020B0604020202020204" pitchFamily="34" charset="0"/>
               <a:buChar char="•"/>
             </a:pPr>
             <a:r>
-              <a:rPr lang="en-GB" b="1" dirty="0"/>
-              <a:t>Reason for Use</a:t>
-            </a:r>
-            <a:r>
               <a:rPr lang="en-GB" dirty="0"/>
-              <a:t>:</a:t>
-            </a:r>
-          </a:p>
-          <a:p>
-            <a:pPr lvl="1">
+              <a:t>This project utilised open-source datasets to gather essential information about businesses:</a:t>
+            </a:r>
+          </a:p>
+          <a:p>
+            <a:pPr marL="628650" lvl="1" indent="-171450">
               <a:buFont typeface="Arial" panose="020B0604020202020204" pitchFamily="34" charset="0"/>
               <a:buChar char="•"/>
             </a:pPr>
             <a:r>
+              <a:rPr lang="en-GB" b="1" dirty="0" err="1"/>
+              <a:t>OpenLocal</a:t>
+            </a:r>
+            <a:r>
               <a:rPr lang="en-GB" dirty="0"/>
-              <a:t>Comprehensive and publicly available data.</a:t>
-            </a:r>
-          </a:p>
-          <a:p>
-            <a:pPr lvl="1">
+              <a:t>: Provided rateable values and property data.</a:t>
+            </a:r>
+          </a:p>
+          <a:p>
+            <a:pPr marL="628650" lvl="1" indent="-171450">
               <a:buFont typeface="Arial" panose="020B0604020202020204" pitchFamily="34" charset="0"/>
               <a:buChar char="•"/>
             </a:pPr>
             <a:r>
+              <a:rPr lang="en-GB" b="1" dirty="0" err="1"/>
+              <a:t>GeoLytix</a:t>
+            </a:r>
+            <a:r>
               <a:rPr lang="en-GB" dirty="0"/>
-              <a:t>Enables geospatial and sector-specific analysis.</a:t>
-            </a:r>
-          </a:p>
-          <a:p>
-            <a:pPr rtl="0"/>
-            <a:endParaRPr lang="en-GB" dirty="0"/>
+              <a:t>: Contained detailed retail store data.</a:t>
+            </a:r>
+          </a:p>
+          <a:p>
+            <a:pPr marL="628650" lvl="1" indent="-171450">
+              <a:buFont typeface="Arial" panose="020B0604020202020204" pitchFamily="34" charset="0"/>
+              <a:buChar char="•"/>
+            </a:pPr>
+            <a:r>
+              <a:rPr lang="en-GB" b="1" dirty="0"/>
+              <a:t>ONS (Office for National Statistics)</a:t>
+            </a:r>
+            <a:r>
+              <a:rPr lang="en-GB" dirty="0"/>
+              <a:t>: Offered statistics on population, household income, and economic activity.</a:t>
+            </a:r>
+          </a:p>
+          <a:p>
+            <a:pPr marL="628650" lvl="1" indent="-171450">
+              <a:buFont typeface="Arial" panose="020B0604020202020204" pitchFamily="34" charset="0"/>
+              <a:buChar char="•"/>
+            </a:pPr>
+            <a:r>
+              <a:rPr lang="en-GB" b="1" dirty="0" err="1"/>
+              <a:t>OpenStreetMaps</a:t>
+            </a:r>
+            <a:r>
+              <a:rPr lang="en-GB" dirty="0"/>
+              <a:t>: Helped calculate distances to transport links and waterways.</a:t>
+            </a:r>
+          </a:p>
+          <a:p>
+            <a:pPr marL="171450" indent="-171450">
+              <a:buFont typeface="Arial" panose="020B0604020202020204" pitchFamily="34" charset="0"/>
+              <a:buChar char="•"/>
+            </a:pPr>
+            <a:r>
+              <a:rPr lang="en-GB" dirty="0"/>
+              <a:t>These datasets were chosen for their relevance and public accessibility, despite some limitations in accuracy and completeness.</a:t>
+            </a:r>
           </a:p>
         </p:txBody>
       </p:sp>
@@ -979,6 +2368,1452 @@
     <p:extLst>
       <p:ext uri="{BB962C8B-B14F-4D97-AF65-F5344CB8AC3E}">
         <p14:creationId xmlns:p14="http://schemas.microsoft.com/office/powerpoint/2010/main" val="3937284324"/>
+      </p:ext>
+    </p:extLst>
+  </p:cSld>
+  <p:clrMapOvr>
+    <a:masterClrMapping/>
+  </p:clrMapOvr>
+</p:notes>
+</file>
+
+<file path=ppt/notesSlides/notesSlide4.xml><?xml version="1.0" encoding="utf-8"?>
+<p:notes xmlns:a="http://schemas.openxmlformats.org/drawingml/2006/main" xmlns:r="http://schemas.openxmlformats.org/officeDocument/2006/relationships" xmlns:p="http://schemas.openxmlformats.org/presentationml/2006/main">
+  <p:cSld>
+    <p:spTree>
+      <p:nvGrpSpPr>
+        <p:cNvPr id="1" name=""/>
+        <p:cNvGrpSpPr/>
+        <p:nvPr/>
+      </p:nvGrpSpPr>
+      <p:grpSpPr>
+        <a:xfrm>
+          <a:off x="0" y="0"/>
+          <a:ext cx="0" cy="0"/>
+          <a:chOff x="0" y="0"/>
+          <a:chExt cx="0" cy="0"/>
+        </a:xfrm>
+      </p:grpSpPr>
+      <p:sp>
+        <p:nvSpPr>
+          <p:cNvPr id="2" name="Slide Image Placeholder 1"/>
+          <p:cNvSpPr>
+            <a:spLocks noGrp="1" noRot="1" noChangeAspect="1"/>
+          </p:cNvSpPr>
+          <p:nvPr>
+            <p:ph type="sldImg"/>
+          </p:nvPr>
+        </p:nvSpPr>
+        <p:spPr/>
+      </p:sp>
+      <p:sp>
+        <p:nvSpPr>
+          <p:cNvPr id="3" name="Notes Placeholder 2"/>
+          <p:cNvSpPr>
+            <a:spLocks noGrp="1"/>
+          </p:cNvSpPr>
+          <p:nvPr>
+            <p:ph type="body" idx="1"/>
+          </p:nvPr>
+        </p:nvSpPr>
+        <p:spPr/>
+        <p:txBody>
+          <a:bodyPr/>
+          <a:lstStyle/>
+          <a:p>
+            <a:pPr marL="171450" indent="-171450">
+              <a:buFont typeface="Arial" panose="020B0604020202020204" pitchFamily="34" charset="0"/>
+              <a:buChar char="•"/>
+            </a:pPr>
+            <a:r>
+              <a:rPr lang="en-GB" dirty="0"/>
+              <a:t>I have developed three models to estimate turnover, improving the approach progressively:</a:t>
+            </a:r>
+          </a:p>
+          <a:p>
+            <a:pPr marL="628650" lvl="1" indent="-171450">
+              <a:buFont typeface="Arial" panose="020B0604020202020204" pitchFamily="34" charset="0"/>
+              <a:buChar char="•"/>
+            </a:pPr>
+            <a:r>
+              <a:rPr lang="en-GB" b="1" dirty="0"/>
+              <a:t>Model 1</a:t>
+            </a:r>
+            <a:r>
+              <a:rPr lang="en-GB" dirty="0"/>
+              <a:t>: A simple baseline model using rateable values and multipliers based on the sector.</a:t>
+            </a:r>
+          </a:p>
+          <a:p>
+            <a:pPr marL="628650" lvl="1" indent="-171450">
+              <a:buFont typeface="Arial" panose="020B0604020202020204" pitchFamily="34" charset="0"/>
+              <a:buChar char="•"/>
+            </a:pPr>
+            <a:r>
+              <a:rPr lang="en-GB" b="1" dirty="0"/>
+              <a:t>Model 2</a:t>
+            </a:r>
+            <a:r>
+              <a:rPr lang="en-GB" dirty="0"/>
+              <a:t>: Enhanced with geospatial features like proximity to transport and waterways.</a:t>
+            </a:r>
+          </a:p>
+          <a:p>
+            <a:pPr marL="628650" lvl="1" indent="-171450">
+              <a:buFont typeface="Arial" panose="020B0604020202020204" pitchFamily="34" charset="0"/>
+              <a:buChar char="•"/>
+            </a:pPr>
+            <a:r>
+              <a:rPr lang="en-GB" b="1" dirty="0"/>
+              <a:t>Model 3</a:t>
+            </a:r>
+            <a:r>
+              <a:rPr lang="en-GB" dirty="0"/>
+              <a:t>: Incorporated company-level turnover data to refine estimates.</a:t>
+            </a:r>
+          </a:p>
+          <a:p>
+            <a:pPr marL="171450" indent="-171450">
+              <a:buFont typeface="Arial" panose="020B0604020202020204" pitchFamily="34" charset="0"/>
+              <a:buChar char="•"/>
+            </a:pPr>
+            <a:r>
+              <a:rPr lang="en-GB" b="1" dirty="0"/>
+              <a:t>Steps in my approach</a:t>
+            </a:r>
+            <a:r>
+              <a:rPr lang="en-GB" dirty="0"/>
+              <a:t>:</a:t>
+            </a:r>
+          </a:p>
+          <a:p>
+            <a:pPr marL="628650" lvl="1" indent="-171450">
+              <a:buFont typeface="Arial" panose="020B0604020202020204" pitchFamily="34" charset="0"/>
+              <a:buChar char="•"/>
+            </a:pPr>
+            <a:r>
+              <a:rPr lang="en-GB" dirty="0"/>
+              <a:t>Cleaned the datasets to handle missing values.</a:t>
+            </a:r>
+          </a:p>
+          <a:p>
+            <a:pPr marL="628650" lvl="1" indent="-171450">
+              <a:buFont typeface="Arial" panose="020B0604020202020204" pitchFamily="34" charset="0"/>
+              <a:buChar char="•"/>
+            </a:pPr>
+            <a:r>
+              <a:rPr lang="en-GB" dirty="0"/>
+              <a:t>Matched addresses across datasets to enrich data with firmographic and geospatial features.</a:t>
+            </a:r>
+          </a:p>
+          <a:p>
+            <a:pPr marL="628650" lvl="1" indent="-171450">
+              <a:buFont typeface="Arial" panose="020B0604020202020204" pitchFamily="34" charset="0"/>
+              <a:buChar char="•"/>
+            </a:pPr>
+            <a:r>
+              <a:rPr lang="en-GB" dirty="0"/>
+              <a:t>Engineered features to include factors like distance to infrastructure and property floor area.</a:t>
+            </a:r>
+          </a:p>
+          <a:p>
+            <a:pPr marL="171450" indent="-171450">
+              <a:buFont typeface="Arial" panose="020B0604020202020204" pitchFamily="34" charset="0"/>
+              <a:buChar char="•"/>
+            </a:pPr>
+            <a:endParaRPr lang="en-GB" dirty="0"/>
+          </a:p>
+        </p:txBody>
+      </p:sp>
+      <p:sp>
+        <p:nvSpPr>
+          <p:cNvPr id="4" name="Slide Number Placeholder 3"/>
+          <p:cNvSpPr>
+            <a:spLocks noGrp="1"/>
+          </p:cNvSpPr>
+          <p:nvPr>
+            <p:ph type="sldNum" sz="quarter" idx="5"/>
+          </p:nvPr>
+        </p:nvSpPr>
+        <p:spPr/>
+        <p:txBody>
+          <a:bodyPr/>
+          <a:lstStyle/>
+          <a:p>
+            <a:pPr rtl="0"/>
+            <a:fld id="{333E963C-1534-4F8D-B2A7-66D81AA25953}" type="slidenum">
+              <a:rPr lang="en-GB" noProof="0" smtClean="0"/>
+              <a:t>4</a:t>
+            </a:fld>
+            <a:endParaRPr lang="en-GB" noProof="0"/>
+          </a:p>
+        </p:txBody>
+      </p:sp>
+    </p:spTree>
+    <p:extLst>
+      <p:ext uri="{BB962C8B-B14F-4D97-AF65-F5344CB8AC3E}">
+        <p14:creationId xmlns:p14="http://schemas.microsoft.com/office/powerpoint/2010/main" val="94833317"/>
+      </p:ext>
+    </p:extLst>
+  </p:cSld>
+  <p:clrMapOvr>
+    <a:masterClrMapping/>
+  </p:clrMapOvr>
+</p:notes>
+</file>
+
+<file path=ppt/notesSlides/notesSlide5.xml><?xml version="1.0" encoding="utf-8"?>
+<p:notes xmlns:a="http://schemas.openxmlformats.org/drawingml/2006/main" xmlns:r="http://schemas.openxmlformats.org/officeDocument/2006/relationships" xmlns:p="http://schemas.openxmlformats.org/presentationml/2006/main">
+  <p:cSld>
+    <p:spTree>
+      <p:nvGrpSpPr>
+        <p:cNvPr id="1" name=""/>
+        <p:cNvGrpSpPr/>
+        <p:nvPr/>
+      </p:nvGrpSpPr>
+      <p:grpSpPr>
+        <a:xfrm>
+          <a:off x="0" y="0"/>
+          <a:ext cx="0" cy="0"/>
+          <a:chOff x="0" y="0"/>
+          <a:chExt cx="0" cy="0"/>
+        </a:xfrm>
+      </p:grpSpPr>
+      <p:sp>
+        <p:nvSpPr>
+          <p:cNvPr id="2" name="Slide Image Placeholder 1"/>
+          <p:cNvSpPr>
+            <a:spLocks noGrp="1" noRot="1" noChangeAspect="1"/>
+          </p:cNvSpPr>
+          <p:nvPr>
+            <p:ph type="sldImg"/>
+          </p:nvPr>
+        </p:nvSpPr>
+        <p:spPr/>
+      </p:sp>
+      <p:sp>
+        <p:nvSpPr>
+          <p:cNvPr id="3" name="Notes Placeholder 2"/>
+          <p:cNvSpPr>
+            <a:spLocks noGrp="1"/>
+          </p:cNvSpPr>
+          <p:nvPr>
+            <p:ph type="body" idx="1"/>
+          </p:nvPr>
+        </p:nvSpPr>
+        <p:spPr/>
+        <p:txBody>
+          <a:bodyPr/>
+          <a:lstStyle/>
+          <a:p>
+            <a:pPr marL="171450" indent="-171450">
+              <a:buFont typeface="Arial" panose="020B0604020202020204" pitchFamily="34" charset="0"/>
+              <a:buChar char="•"/>
+            </a:pPr>
+            <a:r>
+              <a:rPr lang="en-GB" b="1" dirty="0"/>
+              <a:t>Approach</a:t>
+            </a:r>
+            <a:r>
+              <a:rPr lang="en-GB" dirty="0"/>
+              <a:t>: Used the property’s rateable value multiplied by a sector-specific multiplier.</a:t>
+            </a:r>
+          </a:p>
+          <a:p>
+            <a:pPr marL="171450" indent="-171450">
+              <a:buFont typeface="Arial" panose="020B0604020202020204" pitchFamily="34" charset="0"/>
+              <a:buChar char="•"/>
+            </a:pPr>
+            <a:r>
+              <a:rPr lang="en-GB" b="1" dirty="0"/>
+              <a:t>Why Multipliers?</a:t>
+            </a:r>
+          </a:p>
+          <a:p>
+            <a:pPr marL="628650" lvl="1" indent="-171450">
+              <a:buFont typeface="Arial" panose="020B0604020202020204" pitchFamily="34" charset="0"/>
+              <a:buChar char="•"/>
+            </a:pPr>
+            <a:r>
+              <a:rPr lang="en-GB" dirty="0"/>
+              <a:t>Businesses with more customer interaction, like pubs and restaurants, tend to generate higher revenue.</a:t>
+            </a:r>
+          </a:p>
+          <a:p>
+            <a:pPr marL="628650" lvl="1" indent="-171450">
+              <a:buFont typeface="Arial" panose="020B0604020202020204" pitchFamily="34" charset="0"/>
+              <a:buChar char="•"/>
+            </a:pPr>
+            <a:r>
+              <a:rPr lang="en-GB" dirty="0"/>
+              <a:t>Non-commercial properties, such as schools, have minimal turnover and use lower multipliers.</a:t>
+            </a:r>
+          </a:p>
+          <a:p>
+            <a:pPr marL="171450" indent="-171450">
+              <a:buFont typeface="Arial" panose="020B0604020202020204" pitchFamily="34" charset="0"/>
+              <a:buChar char="•"/>
+            </a:pPr>
+            <a:r>
+              <a:rPr lang="en-GB" b="1" dirty="0"/>
+              <a:t>Example</a:t>
+            </a:r>
+            <a:r>
+              <a:rPr lang="en-GB" dirty="0"/>
+              <a:t>: For a retail store  like Aldi with a rateable value of £280,000 and a multiplier of 5, the estimated turnover is £1,400,000.</a:t>
+            </a:r>
+          </a:p>
+          <a:p>
+            <a:pPr marL="171450" indent="-171450">
+              <a:buFont typeface="Arial" panose="020B0604020202020204" pitchFamily="34" charset="0"/>
+              <a:buChar char="•"/>
+            </a:pPr>
+            <a:endParaRPr lang="en-GB" dirty="0"/>
+          </a:p>
+          <a:p>
+            <a:pPr marL="171450" indent="-171450">
+              <a:buFont typeface="Arial" panose="020B0604020202020204" pitchFamily="34" charset="0"/>
+              <a:buChar char="•"/>
+            </a:pPr>
+            <a:endParaRPr lang="en-GB" dirty="0"/>
+          </a:p>
+          <a:p>
+            <a:pPr marL="171450" indent="-171450">
+              <a:buFont typeface="Arial" panose="020B0604020202020204" pitchFamily="34" charset="0"/>
+              <a:buChar char="•"/>
+            </a:pPr>
+            <a:endParaRPr lang="en-GB" dirty="0"/>
+          </a:p>
+          <a:p>
+            <a:pPr>
+              <a:lnSpc>
+                <a:spcPct val="107000"/>
+              </a:lnSpc>
+              <a:spcAft>
+                <a:spcPts val="800"/>
+              </a:spcAft>
+            </a:pPr>
+            <a:r>
+              <a:rPr lang="en-GB" sz="1100" kern="100" dirty="0">
+                <a:effectLst/>
+                <a:latin typeface="Calibri" panose="020F0502020204030204" pitchFamily="34" charset="0"/>
+                <a:ea typeface="Calibri" panose="020F0502020204030204" pitchFamily="34" charset="0"/>
+                <a:cs typeface="Times New Roman" panose="02020603050405020304" pitchFamily="18" charset="0"/>
+              </a:rPr>
+              <a:t>Standard Reasoning:</a:t>
+            </a:r>
+          </a:p>
+          <a:p>
+            <a:pPr marL="342900" lvl="0" indent="-342900">
+              <a:lnSpc>
+                <a:spcPct val="107000"/>
+              </a:lnSpc>
+              <a:buFont typeface="+mj-lt"/>
+              <a:buAutoNum type="arabicPeriod"/>
+            </a:pPr>
+            <a:r>
+              <a:rPr lang="en-GB" sz="1100" kern="100" dirty="0">
+                <a:effectLst/>
+                <a:latin typeface="Calibri" panose="020F0502020204030204" pitchFamily="34" charset="0"/>
+                <a:ea typeface="Calibri" panose="020F0502020204030204" pitchFamily="34" charset="0"/>
+                <a:cs typeface="Times New Roman" panose="02020603050405020304" pitchFamily="18" charset="0"/>
+              </a:rPr>
+              <a:t>Sectors that occur at least 500 times so that we can assign multipliers to each sector and the rest are defaulted to 5. Reasons being is because there would be too many sectors to assign multipliers to.</a:t>
+            </a:r>
+          </a:p>
+          <a:p>
+            <a:pPr marL="342900" lvl="0" indent="-342900">
+              <a:lnSpc>
+                <a:spcPct val="107000"/>
+              </a:lnSpc>
+              <a:buFont typeface="+mj-lt"/>
+              <a:buAutoNum type="arabicPeriod"/>
+            </a:pPr>
+            <a:r>
+              <a:rPr lang="en-GB" sz="1100" kern="100" dirty="0">
+                <a:effectLst/>
+                <a:latin typeface="Calibri" panose="020F0502020204030204" pitchFamily="34" charset="0"/>
+                <a:ea typeface="Calibri" panose="020F0502020204030204" pitchFamily="34" charset="0"/>
+                <a:cs typeface="Times New Roman" panose="02020603050405020304" pitchFamily="18" charset="0"/>
+              </a:rPr>
+              <a:t>The assigned multipliers reflect the turnover potential of each sector, considering:</a:t>
+            </a:r>
+          </a:p>
+          <a:p>
+            <a:pPr marL="742950" lvl="1" indent="-285750">
+              <a:lnSpc>
+                <a:spcPct val="107000"/>
+              </a:lnSpc>
+              <a:buFont typeface="Courier New" panose="02070309020205020404" pitchFamily="49" charset="0"/>
+              <a:buChar char="o"/>
+            </a:pPr>
+            <a:r>
+              <a:rPr lang="en-GB" sz="1100" kern="100" dirty="0">
+                <a:effectLst/>
+                <a:latin typeface="Calibri" panose="020F0502020204030204" pitchFamily="34" charset="0"/>
+                <a:ea typeface="Calibri" panose="020F0502020204030204" pitchFamily="34" charset="0"/>
+                <a:cs typeface="Times New Roman" panose="02020603050405020304" pitchFamily="18" charset="0"/>
+              </a:rPr>
+              <a:t>Customer Interaction: Sectors with direct customer interaction (e.g., restaurants, pubs, showrooms) have higher multipliers.</a:t>
+            </a:r>
+          </a:p>
+          <a:p>
+            <a:pPr marL="742950" lvl="1" indent="-285750">
+              <a:lnSpc>
+                <a:spcPct val="107000"/>
+              </a:lnSpc>
+              <a:buFont typeface="Courier New" panose="02070309020205020404" pitchFamily="49" charset="0"/>
+              <a:buChar char="o"/>
+            </a:pPr>
+            <a:r>
+              <a:rPr lang="en-GB" sz="1100" kern="100" dirty="0">
+                <a:effectLst/>
+                <a:latin typeface="Calibri" panose="020F0502020204030204" pitchFamily="34" charset="0"/>
+                <a:ea typeface="Calibri" panose="020F0502020204030204" pitchFamily="34" charset="0"/>
+                <a:cs typeface="Times New Roman" panose="02020603050405020304" pitchFamily="18" charset="0"/>
+              </a:rPr>
+              <a:t>Revenue Model: Businesses generating rental or service fees (e.g., car parks, communication stations) have lower multipliers.</a:t>
+            </a:r>
+          </a:p>
+          <a:p>
+            <a:pPr marL="742950" lvl="1" indent="-285750">
+              <a:lnSpc>
+                <a:spcPct val="107000"/>
+              </a:lnSpc>
+              <a:buFont typeface="Courier New" panose="02070309020205020404" pitchFamily="49" charset="0"/>
+              <a:buChar char="o"/>
+            </a:pPr>
+            <a:r>
+              <a:rPr lang="en-GB" sz="1100" kern="100" dirty="0">
+                <a:effectLst/>
+                <a:latin typeface="Calibri" panose="020F0502020204030204" pitchFamily="34" charset="0"/>
+                <a:ea typeface="Calibri" panose="020F0502020204030204" pitchFamily="34" charset="0"/>
+                <a:cs typeface="Times New Roman" panose="02020603050405020304" pitchFamily="18" charset="0"/>
+              </a:rPr>
+              <a:t>Sector-Specific Trends: Industries with higher-value transactions or production capabilities have proportionally higher multipliers.</a:t>
+            </a:r>
+          </a:p>
+          <a:p>
+            <a:pPr marL="742950" lvl="1" indent="-285750">
+              <a:lnSpc>
+                <a:spcPct val="107000"/>
+              </a:lnSpc>
+              <a:spcAft>
+                <a:spcPts val="800"/>
+              </a:spcAft>
+              <a:buFont typeface="Courier New" panose="02070309020205020404" pitchFamily="49" charset="0"/>
+              <a:buChar char="o"/>
+            </a:pPr>
+            <a:r>
+              <a:rPr lang="en-GB" sz="1100" kern="100" dirty="0">
+                <a:effectLst/>
+                <a:latin typeface="Calibri" panose="020F0502020204030204" pitchFamily="34" charset="0"/>
+                <a:ea typeface="Calibri" panose="020F0502020204030204" pitchFamily="34" charset="0"/>
+                <a:cs typeface="Times New Roman" panose="02020603050405020304" pitchFamily="18" charset="0"/>
+              </a:rPr>
+              <a:t>Non-Commercial Properties: Minimal multipliers are applied to sectors like schools or community </a:t>
+            </a:r>
+            <a:r>
+              <a:rPr lang="en-GB" sz="1100" kern="100" dirty="0" err="1">
+                <a:effectLst/>
+                <a:latin typeface="Calibri" panose="020F0502020204030204" pitchFamily="34" charset="0"/>
+                <a:ea typeface="Calibri" panose="020F0502020204030204" pitchFamily="34" charset="0"/>
+                <a:cs typeface="Times New Roman" panose="02020603050405020304" pitchFamily="18" charset="0"/>
+              </a:rPr>
+              <a:t>centers</a:t>
+            </a:r>
+            <a:r>
+              <a:rPr lang="en-GB" sz="1100" kern="100" dirty="0">
+                <a:effectLst/>
+                <a:latin typeface="Calibri" panose="020F0502020204030204" pitchFamily="34" charset="0"/>
+                <a:ea typeface="Calibri" panose="020F0502020204030204" pitchFamily="34" charset="0"/>
+                <a:cs typeface="Times New Roman" panose="02020603050405020304" pitchFamily="18" charset="0"/>
+              </a:rPr>
+              <a:t>, which do not operate for profit.</a:t>
+            </a:r>
+          </a:p>
+          <a:p>
+            <a:pPr marL="171450" indent="-171450">
+              <a:buFont typeface="Arial" panose="020B0604020202020204" pitchFamily="34" charset="0"/>
+              <a:buChar char="•"/>
+            </a:pPr>
+            <a:endParaRPr lang="en-GB" dirty="0"/>
+          </a:p>
+        </p:txBody>
+      </p:sp>
+      <p:sp>
+        <p:nvSpPr>
+          <p:cNvPr id="4" name="Slide Number Placeholder 3"/>
+          <p:cNvSpPr>
+            <a:spLocks noGrp="1"/>
+          </p:cNvSpPr>
+          <p:nvPr>
+            <p:ph type="sldNum" sz="quarter" idx="5"/>
+          </p:nvPr>
+        </p:nvSpPr>
+        <p:spPr/>
+        <p:txBody>
+          <a:bodyPr/>
+          <a:lstStyle/>
+          <a:p>
+            <a:pPr rtl="0"/>
+            <a:fld id="{333E963C-1534-4F8D-B2A7-66D81AA25953}" type="slidenum">
+              <a:rPr lang="en-GB" noProof="0" smtClean="0"/>
+              <a:t>5</a:t>
+            </a:fld>
+            <a:endParaRPr lang="en-GB" noProof="0"/>
+          </a:p>
+        </p:txBody>
+      </p:sp>
+    </p:spTree>
+    <p:extLst>
+      <p:ext uri="{BB962C8B-B14F-4D97-AF65-F5344CB8AC3E}">
+        <p14:creationId xmlns:p14="http://schemas.microsoft.com/office/powerpoint/2010/main" val="1907456843"/>
+      </p:ext>
+    </p:extLst>
+  </p:cSld>
+  <p:clrMapOvr>
+    <a:masterClrMapping/>
+  </p:clrMapOvr>
+</p:notes>
+</file>
+
+<file path=ppt/notesSlides/notesSlide6.xml><?xml version="1.0" encoding="utf-8"?>
+<p:notes xmlns:a="http://schemas.openxmlformats.org/drawingml/2006/main" xmlns:r="http://schemas.openxmlformats.org/officeDocument/2006/relationships" xmlns:p="http://schemas.openxmlformats.org/presentationml/2006/main">
+  <p:cSld>
+    <p:spTree>
+      <p:nvGrpSpPr>
+        <p:cNvPr id="1" name=""/>
+        <p:cNvGrpSpPr/>
+        <p:nvPr/>
+      </p:nvGrpSpPr>
+      <p:grpSpPr>
+        <a:xfrm>
+          <a:off x="0" y="0"/>
+          <a:ext cx="0" cy="0"/>
+          <a:chOff x="0" y="0"/>
+          <a:chExt cx="0" cy="0"/>
+        </a:xfrm>
+      </p:grpSpPr>
+      <p:sp>
+        <p:nvSpPr>
+          <p:cNvPr id="2" name="Slide Image Placeholder 1"/>
+          <p:cNvSpPr>
+            <a:spLocks noGrp="1" noRot="1" noChangeAspect="1"/>
+          </p:cNvSpPr>
+          <p:nvPr>
+            <p:ph type="sldImg"/>
+          </p:nvPr>
+        </p:nvSpPr>
+        <p:spPr/>
+      </p:sp>
+      <p:sp>
+        <p:nvSpPr>
+          <p:cNvPr id="3" name="Notes Placeholder 2"/>
+          <p:cNvSpPr>
+            <a:spLocks noGrp="1"/>
+          </p:cNvSpPr>
+          <p:nvPr>
+            <p:ph type="body" idx="1"/>
+          </p:nvPr>
+        </p:nvSpPr>
+        <p:spPr/>
+        <p:txBody>
+          <a:bodyPr/>
+          <a:lstStyle/>
+          <a:p>
+            <a:pPr marL="171450" indent="-171450">
+              <a:buFont typeface="Arial" panose="020B0604020202020204" pitchFamily="34" charset="0"/>
+              <a:buChar char="•"/>
+            </a:pPr>
+            <a:r>
+              <a:rPr lang="en-GB" b="1" dirty="0"/>
+              <a:t>Enhancements</a:t>
+            </a:r>
+            <a:r>
+              <a:rPr lang="en-GB" dirty="0"/>
+              <a:t>: I had calculated each business's distance to the nearest transport link and waterway using </a:t>
+            </a:r>
+            <a:r>
+              <a:rPr lang="en-GB" dirty="0" err="1"/>
+              <a:t>OpenStreetMaps</a:t>
+            </a:r>
+            <a:r>
+              <a:rPr lang="en-GB" dirty="0"/>
+              <a:t>.</a:t>
+            </a:r>
+          </a:p>
+          <a:p>
+            <a:pPr marL="171450" indent="-171450">
+              <a:buFont typeface="Arial" panose="020B0604020202020204" pitchFamily="34" charset="0"/>
+              <a:buChar char="•"/>
+            </a:pPr>
+            <a:r>
+              <a:rPr lang="en-GB" dirty="0"/>
+              <a:t>These distances were combined with rateable values to refine turnover predictions.</a:t>
+            </a:r>
+          </a:p>
+          <a:p>
+            <a:pPr marL="171450" indent="-171450">
+              <a:buFont typeface="Arial" panose="020B0604020202020204" pitchFamily="34" charset="0"/>
+              <a:buChar char="•"/>
+            </a:pPr>
+            <a:r>
+              <a:rPr lang="en-GB" b="1" dirty="0"/>
+              <a:t>Example Output</a:t>
+            </a:r>
+            <a:r>
+              <a:rPr lang="en-GB" dirty="0"/>
+              <a:t>:</a:t>
+            </a:r>
+          </a:p>
+          <a:p>
+            <a:pPr marL="628650" lvl="1" indent="-171450">
+              <a:buFont typeface="Arial" panose="020B0604020202020204" pitchFamily="34" charset="0"/>
+              <a:buChar char="•"/>
+            </a:pPr>
+            <a:r>
+              <a:rPr lang="en-GB" dirty="0"/>
+              <a:t>Distance to transport: 58m.</a:t>
+            </a:r>
+          </a:p>
+          <a:p>
+            <a:pPr marL="628650" lvl="1" indent="-171450">
+              <a:buFont typeface="Arial" panose="020B0604020202020204" pitchFamily="34" charset="0"/>
+              <a:buChar char="•"/>
+            </a:pPr>
+            <a:r>
+              <a:rPr lang="en-GB" dirty="0"/>
+              <a:t>Distance to waterway: 963m.</a:t>
+            </a:r>
+          </a:p>
+          <a:p>
+            <a:pPr marL="628650" lvl="1" indent="-171450">
+              <a:buFont typeface="Arial" panose="020B0604020202020204" pitchFamily="34" charset="0"/>
+              <a:buChar char="•"/>
+            </a:pPr>
+            <a:r>
+              <a:rPr lang="en-GB" dirty="0"/>
+              <a:t>Estimated Turnover: £1,400,000.</a:t>
+            </a:r>
+          </a:p>
+          <a:p>
+            <a:pPr marL="171450" indent="-171450">
+              <a:buFont typeface="Arial" panose="020B0604020202020204" pitchFamily="34" charset="0"/>
+              <a:buChar char="•"/>
+            </a:pPr>
+            <a:r>
+              <a:rPr lang="en-GB" dirty="0"/>
+              <a:t>By incorporating these geospatial factors, the model accounts for the accessibility of each business.</a:t>
+            </a:r>
+          </a:p>
+        </p:txBody>
+      </p:sp>
+      <p:sp>
+        <p:nvSpPr>
+          <p:cNvPr id="4" name="Slide Number Placeholder 3"/>
+          <p:cNvSpPr>
+            <a:spLocks noGrp="1"/>
+          </p:cNvSpPr>
+          <p:nvPr>
+            <p:ph type="sldNum" sz="quarter" idx="5"/>
+          </p:nvPr>
+        </p:nvSpPr>
+        <p:spPr/>
+        <p:txBody>
+          <a:bodyPr/>
+          <a:lstStyle/>
+          <a:p>
+            <a:pPr rtl="0"/>
+            <a:fld id="{333E963C-1534-4F8D-B2A7-66D81AA25953}" type="slidenum">
+              <a:rPr lang="en-GB" noProof="0" smtClean="0"/>
+              <a:t>6</a:t>
+            </a:fld>
+            <a:endParaRPr lang="en-GB" noProof="0"/>
+          </a:p>
+        </p:txBody>
+      </p:sp>
+    </p:spTree>
+    <p:extLst>
+      <p:ext uri="{BB962C8B-B14F-4D97-AF65-F5344CB8AC3E}">
+        <p14:creationId xmlns:p14="http://schemas.microsoft.com/office/powerpoint/2010/main" val="3707535928"/>
+      </p:ext>
+    </p:extLst>
+  </p:cSld>
+  <p:clrMapOvr>
+    <a:masterClrMapping/>
+  </p:clrMapOvr>
+</p:notes>
+</file>
+
+<file path=ppt/notesSlides/notesSlide7.xml><?xml version="1.0" encoding="utf-8"?>
+<p:notes xmlns:a="http://schemas.openxmlformats.org/drawingml/2006/main" xmlns:r="http://schemas.openxmlformats.org/officeDocument/2006/relationships" xmlns:p="http://schemas.openxmlformats.org/presentationml/2006/main">
+  <p:cSld>
+    <p:spTree>
+      <p:nvGrpSpPr>
+        <p:cNvPr id="1" name=""/>
+        <p:cNvGrpSpPr/>
+        <p:nvPr/>
+      </p:nvGrpSpPr>
+      <p:grpSpPr>
+        <a:xfrm>
+          <a:off x="0" y="0"/>
+          <a:ext cx="0" cy="0"/>
+          <a:chOff x="0" y="0"/>
+          <a:chExt cx="0" cy="0"/>
+        </a:xfrm>
+      </p:grpSpPr>
+      <p:sp>
+        <p:nvSpPr>
+          <p:cNvPr id="2" name="Slide Image Placeholder 1"/>
+          <p:cNvSpPr>
+            <a:spLocks noGrp="1" noRot="1" noChangeAspect="1"/>
+          </p:cNvSpPr>
+          <p:nvPr>
+            <p:ph type="sldImg"/>
+          </p:nvPr>
+        </p:nvSpPr>
+        <p:spPr/>
+      </p:sp>
+      <p:sp>
+        <p:nvSpPr>
+          <p:cNvPr id="3" name="Notes Placeholder 2"/>
+          <p:cNvSpPr>
+            <a:spLocks noGrp="1"/>
+          </p:cNvSpPr>
+          <p:nvPr>
+            <p:ph type="body" idx="1"/>
+          </p:nvPr>
+        </p:nvSpPr>
+        <p:spPr/>
+        <p:txBody>
+          <a:bodyPr/>
+          <a:lstStyle/>
+          <a:p>
+            <a:pPr marL="171450" indent="-171450">
+              <a:buFont typeface="Arial" panose="020B0604020202020204" pitchFamily="34" charset="0"/>
+              <a:buChar char="•"/>
+            </a:pPr>
+            <a:r>
+              <a:rPr lang="en-GB" b="1" dirty="0"/>
+              <a:t>Approach</a:t>
+            </a:r>
+            <a:r>
+              <a:rPr lang="en-GB" dirty="0"/>
+              <a:t>:</a:t>
+            </a:r>
+          </a:p>
+          <a:p>
+            <a:pPr marL="628650" lvl="1" indent="-171450">
+              <a:buFont typeface="Arial" panose="020B0604020202020204" pitchFamily="34" charset="0"/>
+              <a:buChar char="•"/>
+            </a:pPr>
+            <a:r>
+              <a:rPr lang="en-GB" dirty="0"/>
+              <a:t>Matched businesses to companies using </a:t>
+            </a:r>
+            <a:r>
+              <a:rPr lang="en-GB" dirty="0" err="1"/>
+              <a:t>GeoLytix</a:t>
+            </a:r>
+            <a:r>
+              <a:rPr lang="en-GB" dirty="0"/>
+              <a:t> data and fuzzy address matching.</a:t>
+            </a:r>
+          </a:p>
+          <a:p>
+            <a:pPr marL="628650" lvl="1" indent="-171450">
+              <a:buFont typeface="Arial" panose="020B0604020202020204" pitchFamily="34" charset="0"/>
+              <a:buChar char="•"/>
+            </a:pPr>
+            <a:r>
+              <a:rPr lang="en-GB" dirty="0"/>
+              <a:t>Used a language model to gather company-level statistics, such as total UK turnover and store counts in Manchester.</a:t>
+            </a:r>
+          </a:p>
+          <a:p>
+            <a:pPr marL="628650" lvl="1" indent="-171450">
+              <a:buFont typeface="Arial" panose="020B0604020202020204" pitchFamily="34" charset="0"/>
+              <a:buChar char="•"/>
+            </a:pPr>
+            <a:r>
+              <a:rPr lang="en-GB" dirty="0"/>
+              <a:t>Distributed a company’s total turnover across its stores based on their floor area.</a:t>
+            </a:r>
+          </a:p>
+          <a:p>
+            <a:pPr marL="171450" indent="-171450">
+              <a:buFont typeface="Arial" panose="020B0604020202020204" pitchFamily="34" charset="0"/>
+              <a:buChar char="•"/>
+            </a:pPr>
+            <a:r>
+              <a:rPr lang="en-GB" b="1" dirty="0"/>
+              <a:t>Example</a:t>
+            </a:r>
+            <a:r>
+              <a:rPr lang="en-GB" dirty="0"/>
+              <a:t>: For Aldi:</a:t>
+            </a:r>
+          </a:p>
+          <a:p>
+            <a:pPr marL="628650" lvl="1" indent="-171450">
+              <a:buFont typeface="Arial" panose="020B0604020202020204" pitchFamily="34" charset="0"/>
+              <a:buChar char="•"/>
+            </a:pPr>
+            <a:r>
+              <a:rPr lang="en-GB" dirty="0"/>
+              <a:t>Total UK Turnover: Distributed based on Manchester store count and floor areas.</a:t>
+            </a:r>
+          </a:p>
+          <a:p>
+            <a:pPr marL="628650" lvl="1" indent="-171450">
+              <a:buFont typeface="Arial" panose="020B0604020202020204" pitchFamily="34" charset="0"/>
+              <a:buChar char="•"/>
+            </a:pPr>
+            <a:r>
+              <a:rPr lang="en-GB" dirty="0"/>
+              <a:t>This model provides a more realistic turnover estimate for retail businesses.</a:t>
+            </a:r>
+          </a:p>
+          <a:p>
+            <a:pPr marL="171450" indent="-171450">
+              <a:buFont typeface="Arial" panose="020B0604020202020204" pitchFamily="34" charset="0"/>
+              <a:buChar char="•"/>
+            </a:pPr>
+            <a:endParaRPr lang="en-GB" dirty="0"/>
+          </a:p>
+        </p:txBody>
+      </p:sp>
+      <p:sp>
+        <p:nvSpPr>
+          <p:cNvPr id="4" name="Slide Number Placeholder 3"/>
+          <p:cNvSpPr>
+            <a:spLocks noGrp="1"/>
+          </p:cNvSpPr>
+          <p:nvPr>
+            <p:ph type="sldNum" sz="quarter" idx="5"/>
+          </p:nvPr>
+        </p:nvSpPr>
+        <p:spPr/>
+        <p:txBody>
+          <a:bodyPr/>
+          <a:lstStyle/>
+          <a:p>
+            <a:pPr rtl="0"/>
+            <a:fld id="{333E963C-1534-4F8D-B2A7-66D81AA25953}" type="slidenum">
+              <a:rPr lang="en-GB" noProof="0" smtClean="0"/>
+              <a:t>7</a:t>
+            </a:fld>
+            <a:endParaRPr lang="en-GB" noProof="0"/>
+          </a:p>
+        </p:txBody>
+      </p:sp>
+    </p:spTree>
+    <p:extLst>
+      <p:ext uri="{BB962C8B-B14F-4D97-AF65-F5344CB8AC3E}">
+        <p14:creationId xmlns:p14="http://schemas.microsoft.com/office/powerpoint/2010/main" val="262034313"/>
+      </p:ext>
+    </p:extLst>
+  </p:cSld>
+  <p:clrMapOvr>
+    <a:masterClrMapping/>
+  </p:clrMapOvr>
+</p:notes>
+</file>
+
+<file path=ppt/notesSlides/notesSlide8.xml><?xml version="1.0" encoding="utf-8"?>
+<p:notes xmlns:a="http://schemas.openxmlformats.org/drawingml/2006/main" xmlns:r="http://schemas.openxmlformats.org/officeDocument/2006/relationships" xmlns:p="http://schemas.openxmlformats.org/presentationml/2006/main">
+  <p:cSld>
+    <p:spTree>
+      <p:nvGrpSpPr>
+        <p:cNvPr id="1" name=""/>
+        <p:cNvGrpSpPr/>
+        <p:nvPr/>
+      </p:nvGrpSpPr>
+      <p:grpSpPr>
+        <a:xfrm>
+          <a:off x="0" y="0"/>
+          <a:ext cx="0" cy="0"/>
+          <a:chOff x="0" y="0"/>
+          <a:chExt cx="0" cy="0"/>
+        </a:xfrm>
+      </p:grpSpPr>
+      <p:sp>
+        <p:nvSpPr>
+          <p:cNvPr id="2" name="Slide Image Placeholder 1"/>
+          <p:cNvSpPr>
+            <a:spLocks noGrp="1" noRot="1" noChangeAspect="1"/>
+          </p:cNvSpPr>
+          <p:nvPr>
+            <p:ph type="sldImg"/>
+          </p:nvPr>
+        </p:nvSpPr>
+        <p:spPr/>
+      </p:sp>
+      <p:sp>
+        <p:nvSpPr>
+          <p:cNvPr id="3" name="Notes Placeholder 2"/>
+          <p:cNvSpPr>
+            <a:spLocks noGrp="1"/>
+          </p:cNvSpPr>
+          <p:nvPr>
+            <p:ph type="body" idx="1"/>
+          </p:nvPr>
+        </p:nvSpPr>
+        <p:spPr/>
+        <p:txBody>
+          <a:bodyPr/>
+          <a:lstStyle/>
+          <a:p>
+            <a:pPr marL="171450" indent="-171450">
+              <a:buFont typeface="Arial" panose="020B0604020202020204" pitchFamily="34" charset="0"/>
+              <a:buChar char="•"/>
+            </a:pPr>
+            <a:r>
+              <a:rPr lang="en-GB" b="1" dirty="0"/>
+              <a:t>Challenges</a:t>
+            </a:r>
+            <a:r>
+              <a:rPr lang="en-GB" dirty="0"/>
+              <a:t>:</a:t>
+            </a:r>
+          </a:p>
+          <a:p>
+            <a:pPr marL="628650" lvl="1" indent="-171450">
+              <a:buFont typeface="Arial" panose="020B0604020202020204" pitchFamily="34" charset="0"/>
+              <a:buChar char="•"/>
+            </a:pPr>
+            <a:r>
+              <a:rPr lang="en-GB" dirty="0"/>
+              <a:t>The </a:t>
+            </a:r>
+            <a:r>
+              <a:rPr lang="en-GB" dirty="0" err="1"/>
+              <a:t>OpenLocal</a:t>
+            </a:r>
+            <a:r>
+              <a:rPr lang="en-GB" dirty="0"/>
+              <a:t> dataset had significant gaps, such as missing rateable values for 42% of businesses.</a:t>
+            </a:r>
+          </a:p>
+          <a:p>
+            <a:pPr marL="628650" lvl="1" indent="-171450">
+              <a:buFont typeface="Arial" panose="020B0604020202020204" pitchFamily="34" charset="0"/>
+              <a:buChar char="•"/>
+            </a:pPr>
+            <a:r>
+              <a:rPr lang="en-GB" dirty="0" err="1"/>
+              <a:t>Geolytix</a:t>
+            </a:r>
+            <a:r>
+              <a:rPr lang="en-GB" dirty="0"/>
+              <a:t> and </a:t>
+            </a:r>
+            <a:r>
+              <a:rPr lang="en-GB" dirty="0" err="1"/>
+              <a:t>OpenLocal</a:t>
+            </a:r>
+            <a:r>
+              <a:rPr lang="en-GB" dirty="0"/>
+              <a:t> required address matching, which was not always accurate.</a:t>
+            </a:r>
+          </a:p>
+          <a:p>
+            <a:pPr marL="171450" indent="-171450">
+              <a:buFont typeface="Arial" panose="020B0604020202020204" pitchFamily="34" charset="0"/>
+              <a:buChar char="•"/>
+            </a:pPr>
+            <a:r>
+              <a:rPr lang="en-GB" b="1" dirty="0"/>
+              <a:t>Improvements</a:t>
+            </a:r>
+            <a:r>
+              <a:rPr lang="en-GB" dirty="0"/>
+              <a:t>:</a:t>
+            </a:r>
+          </a:p>
+          <a:p>
+            <a:pPr marL="628650" lvl="1" indent="-171450">
+              <a:buFont typeface="Arial" panose="020B0604020202020204" pitchFamily="34" charset="0"/>
+              <a:buChar char="•"/>
+            </a:pPr>
+            <a:r>
+              <a:rPr lang="en-GB" dirty="0"/>
+              <a:t>Enrich datasets with more reliable firmographic data.</a:t>
+            </a:r>
+          </a:p>
+          <a:p>
+            <a:pPr marL="628650" lvl="1" indent="-171450">
+              <a:buFont typeface="Arial" panose="020B0604020202020204" pitchFamily="34" charset="0"/>
+              <a:buChar char="•"/>
+            </a:pPr>
+            <a:r>
+              <a:rPr lang="en-GB" dirty="0"/>
+              <a:t>Add features like number of employees or real-time sales data.</a:t>
+            </a:r>
+          </a:p>
+          <a:p>
+            <a:pPr marL="628650" lvl="1" indent="-171450">
+              <a:buFont typeface="Arial" panose="020B0604020202020204" pitchFamily="34" charset="0"/>
+              <a:buChar char="•"/>
+            </a:pPr>
+            <a:r>
+              <a:rPr lang="en-GB" dirty="0"/>
+              <a:t>Experiment with advanced algorithms to further refine predictions.</a:t>
+            </a:r>
+          </a:p>
+          <a:p>
+            <a:endParaRPr lang="en-GB" dirty="0"/>
+          </a:p>
+        </p:txBody>
+      </p:sp>
+      <p:sp>
+        <p:nvSpPr>
+          <p:cNvPr id="4" name="Slide Number Placeholder 3"/>
+          <p:cNvSpPr>
+            <a:spLocks noGrp="1"/>
+          </p:cNvSpPr>
+          <p:nvPr>
+            <p:ph type="sldNum" sz="quarter" idx="5"/>
+          </p:nvPr>
+        </p:nvSpPr>
+        <p:spPr/>
+        <p:txBody>
+          <a:bodyPr/>
+          <a:lstStyle/>
+          <a:p>
+            <a:pPr rtl="0"/>
+            <a:fld id="{333E963C-1534-4F8D-B2A7-66D81AA25953}" type="slidenum">
+              <a:rPr lang="en-GB" noProof="0" smtClean="0"/>
+              <a:t>8</a:t>
+            </a:fld>
+            <a:endParaRPr lang="en-GB" noProof="0"/>
+          </a:p>
+        </p:txBody>
+      </p:sp>
+    </p:spTree>
+    <p:extLst>
+      <p:ext uri="{BB962C8B-B14F-4D97-AF65-F5344CB8AC3E}">
+        <p14:creationId xmlns:p14="http://schemas.microsoft.com/office/powerpoint/2010/main" val="1083541647"/>
+      </p:ext>
+    </p:extLst>
+  </p:cSld>
+  <p:clrMapOvr>
+    <a:masterClrMapping/>
+  </p:clrMapOvr>
+</p:notes>
+</file>
+
+<file path=ppt/notesSlides/notesSlide9.xml><?xml version="1.0" encoding="utf-8"?>
+<p:notes xmlns:a="http://schemas.openxmlformats.org/drawingml/2006/main" xmlns:r="http://schemas.openxmlformats.org/officeDocument/2006/relationships" xmlns:p="http://schemas.openxmlformats.org/presentationml/2006/main">
+  <p:cSld>
+    <p:spTree>
+      <p:nvGrpSpPr>
+        <p:cNvPr id="1" name=""/>
+        <p:cNvGrpSpPr/>
+        <p:nvPr/>
+      </p:nvGrpSpPr>
+      <p:grpSpPr>
+        <a:xfrm>
+          <a:off x="0" y="0"/>
+          <a:ext cx="0" cy="0"/>
+          <a:chOff x="0" y="0"/>
+          <a:chExt cx="0" cy="0"/>
+        </a:xfrm>
+      </p:grpSpPr>
+      <p:sp>
+        <p:nvSpPr>
+          <p:cNvPr id="2" name="Slide Image Placeholder 1"/>
+          <p:cNvSpPr>
+            <a:spLocks noGrp="1" noRot="1" noChangeAspect="1"/>
+          </p:cNvSpPr>
+          <p:nvPr>
+            <p:ph type="sldImg"/>
+          </p:nvPr>
+        </p:nvSpPr>
+        <p:spPr/>
+      </p:sp>
+      <p:sp>
+        <p:nvSpPr>
+          <p:cNvPr id="3" name="Notes Placeholder 2"/>
+          <p:cNvSpPr>
+            <a:spLocks noGrp="1"/>
+          </p:cNvSpPr>
+          <p:nvPr>
+            <p:ph type="body" idx="1"/>
+          </p:nvPr>
+        </p:nvSpPr>
+        <p:spPr/>
+        <p:txBody>
+          <a:bodyPr/>
+          <a:lstStyle/>
+          <a:p>
+            <a:pPr marL="171450" marR="0" lvl="0" indent="-171450" algn="l" defTabSz="914400" rtl="0" eaLnBrk="1" fontAlgn="auto" latinLnBrk="0" hangingPunct="1">
+              <a:lnSpc>
+                <a:spcPct val="100000"/>
+              </a:lnSpc>
+              <a:spcBef>
+                <a:spcPts val="0"/>
+              </a:spcBef>
+              <a:spcAft>
+                <a:spcPts val="0"/>
+              </a:spcAft>
+              <a:buClrTx/>
+              <a:buSzTx/>
+              <a:buFont typeface="Arial" panose="020B0604020202020204" pitchFamily="34" charset="0"/>
+              <a:buChar char="•"/>
+              <a:tabLst/>
+              <a:defRPr/>
+            </a:pPr>
+            <a:r>
+              <a:rPr lang="en-GB" b="1" dirty="0"/>
+              <a:t>Sample Outputs:</a:t>
+            </a:r>
+          </a:p>
+          <a:p>
+            <a:pPr marL="0" marR="0" lvl="0" indent="0" algn="l" defTabSz="914400" rtl="0" eaLnBrk="1" fontAlgn="auto" latinLnBrk="0" hangingPunct="1">
+              <a:lnSpc>
+                <a:spcPct val="100000"/>
+              </a:lnSpc>
+              <a:spcBef>
+                <a:spcPts val="0"/>
+              </a:spcBef>
+              <a:spcAft>
+                <a:spcPts val="0"/>
+              </a:spcAft>
+              <a:buClrTx/>
+              <a:buSzTx/>
+              <a:buFont typeface="Arial" panose="020B0604020202020204" pitchFamily="34" charset="0"/>
+              <a:buNone/>
+              <a:tabLst/>
+              <a:defRPr/>
+            </a:pPr>
+            <a:r>
+              <a:rPr lang="en-GB" b="1" dirty="0"/>
+              <a:t>Asda </a:t>
+            </a:r>
+            <a:r>
+              <a:rPr lang="en-GB" b="1" dirty="0" err="1"/>
+              <a:t>Levenshulme</a:t>
+            </a:r>
+            <a:r>
+              <a:rPr lang="en-GB" b="1" dirty="0"/>
+              <a:t> Supermarket</a:t>
+            </a:r>
+            <a:r>
+              <a:rPr lang="en-GB" dirty="0"/>
+              <a:t>:</a:t>
+            </a:r>
+          </a:p>
+          <a:p>
+            <a:pPr marL="742950" lvl="1" indent="-285750">
+              <a:buFont typeface="Arial" panose="020B0604020202020204" pitchFamily="34" charset="0"/>
+              <a:buChar char="•"/>
+            </a:pPr>
+            <a:r>
+              <a:rPr lang="en-GB" b="1" dirty="0"/>
+              <a:t>Model 1</a:t>
+            </a:r>
+            <a:r>
+              <a:rPr lang="en-GB" dirty="0"/>
+              <a:t> significantly underestimated the actual turnover at £418k compared to £630k.</a:t>
+            </a:r>
+          </a:p>
+          <a:p>
+            <a:pPr marL="742950" lvl="1" indent="-285750">
+              <a:buFont typeface="Arial" panose="020B0604020202020204" pitchFamily="34" charset="0"/>
+              <a:buChar char="•"/>
+            </a:pPr>
+            <a:r>
+              <a:rPr lang="en-GB" b="1" dirty="0"/>
+              <a:t>Model 2</a:t>
+            </a:r>
+            <a:r>
+              <a:rPr lang="en-GB" dirty="0"/>
+              <a:t> showed improvement at £517k but still fell short.</a:t>
+            </a:r>
+          </a:p>
+          <a:p>
+            <a:pPr marL="742950" lvl="1" indent="-285750">
+              <a:buFont typeface="Arial" panose="020B0604020202020204" pitchFamily="34" charset="0"/>
+              <a:buChar char="•"/>
+            </a:pPr>
+            <a:r>
+              <a:rPr lang="en-GB" b="1" dirty="0"/>
+              <a:t>Model 3</a:t>
+            </a:r>
+            <a:r>
+              <a:rPr lang="en-GB" dirty="0"/>
+              <a:t> overestimated with a prediction of £13.1m, while the actual value was £10.4m. This suggests potential issues with the methodology for company turnover distribution.</a:t>
+            </a:r>
+          </a:p>
+          <a:p>
+            <a:pPr marL="742950" lvl="1" indent="-285750">
+              <a:buFont typeface="Arial" panose="020B0604020202020204" pitchFamily="34" charset="0"/>
+              <a:buChar char="•"/>
+            </a:pPr>
+            <a:r>
+              <a:rPr lang="en-GB" dirty="0"/>
+              <a:t>Total turnover for Manchester (£521m) reflects contributions from all stores in the region.</a:t>
+            </a:r>
+          </a:p>
+          <a:p>
+            <a:pPr>
+              <a:buFont typeface="Arial" panose="020B0604020202020204" pitchFamily="34" charset="0"/>
+              <a:buNone/>
+            </a:pPr>
+            <a:endParaRPr lang="en-GB" b="1" dirty="0"/>
+          </a:p>
+          <a:p>
+            <a:pPr>
+              <a:buFont typeface="Arial" panose="020B0604020202020204" pitchFamily="34" charset="0"/>
+              <a:buNone/>
+            </a:pPr>
+            <a:r>
+              <a:rPr lang="en-GB" b="1" dirty="0"/>
+              <a:t>Tesco </a:t>
+            </a:r>
+            <a:r>
+              <a:rPr lang="en-GB" b="1" dirty="0" err="1"/>
+              <a:t>Staylbridge</a:t>
+            </a:r>
+            <a:r>
+              <a:rPr lang="en-GB" b="1" dirty="0"/>
+              <a:t> Superstore</a:t>
+            </a:r>
+            <a:r>
+              <a:rPr lang="en-GB" dirty="0"/>
+              <a:t>:</a:t>
+            </a:r>
+          </a:p>
+          <a:p>
+            <a:pPr marL="742950" lvl="1" indent="-285750">
+              <a:buFont typeface="Arial" panose="020B0604020202020204" pitchFamily="34" charset="0"/>
+              <a:buChar char="•"/>
+            </a:pPr>
+            <a:r>
+              <a:rPr lang="en-GB" b="1" dirty="0"/>
+              <a:t>Model 1</a:t>
+            </a:r>
+            <a:r>
+              <a:rPr lang="en-GB" dirty="0"/>
+              <a:t> slightly overestimated turnover at £5.8m compared to the actual £5m.</a:t>
+            </a:r>
+          </a:p>
+          <a:p>
+            <a:pPr marL="742950" lvl="1" indent="-285750">
+              <a:buFont typeface="Arial" panose="020B0604020202020204" pitchFamily="34" charset="0"/>
+              <a:buChar char="•"/>
+            </a:pPr>
+            <a:r>
+              <a:rPr lang="en-GB" b="1" dirty="0"/>
+              <a:t>Model 2</a:t>
+            </a:r>
+            <a:r>
+              <a:rPr lang="en-GB" dirty="0"/>
+              <a:t> refined this estimate to £5.6m, coming closer to the actual value.</a:t>
+            </a:r>
+          </a:p>
+          <a:p>
+            <a:pPr marL="742950" lvl="1" indent="-285750">
+              <a:buFont typeface="Arial" panose="020B0604020202020204" pitchFamily="34" charset="0"/>
+              <a:buChar char="•"/>
+            </a:pPr>
+            <a:r>
+              <a:rPr lang="en-GB" b="1" dirty="0"/>
+              <a:t>Model 3</a:t>
+            </a:r>
+            <a:r>
+              <a:rPr lang="en-GB" dirty="0"/>
+              <a:t> dramatically overestimated at £73m compared to the actual £125m, suggesting either floor area weight inaccuracies or errors in total turnover distribution.</a:t>
+            </a:r>
+          </a:p>
+          <a:p>
+            <a:pPr marL="742950" lvl="1" indent="-285750">
+              <a:buFont typeface="Arial" panose="020B0604020202020204" pitchFamily="34" charset="0"/>
+              <a:buChar char="•"/>
+            </a:pPr>
+            <a:r>
+              <a:rPr lang="en-GB" dirty="0"/>
+              <a:t>Manchester's total turnover for Tesco was estimated at £791m.</a:t>
+            </a:r>
+          </a:p>
+          <a:p>
+            <a:pPr marL="171450" marR="0" lvl="0" indent="-171450" algn="l" defTabSz="914400" rtl="0" eaLnBrk="1" fontAlgn="auto" latinLnBrk="0" hangingPunct="1">
+              <a:lnSpc>
+                <a:spcPct val="100000"/>
+              </a:lnSpc>
+              <a:spcBef>
+                <a:spcPts val="0"/>
+              </a:spcBef>
+              <a:spcAft>
+                <a:spcPts val="0"/>
+              </a:spcAft>
+              <a:buClrTx/>
+              <a:buSzTx/>
+              <a:buFont typeface="Arial" panose="020B0604020202020204" pitchFamily="34" charset="0"/>
+              <a:buChar char="•"/>
+              <a:tabLst/>
+              <a:defRPr/>
+            </a:pPr>
+            <a:endParaRPr lang="en-GB" b="1" dirty="0"/>
+          </a:p>
+          <a:p>
+            <a:pPr marL="171450" marR="0" lvl="0" indent="-171450" algn="l" defTabSz="914400" rtl="0" eaLnBrk="1" fontAlgn="auto" latinLnBrk="0" hangingPunct="1">
+              <a:lnSpc>
+                <a:spcPct val="100000"/>
+              </a:lnSpc>
+              <a:spcBef>
+                <a:spcPts val="0"/>
+              </a:spcBef>
+              <a:spcAft>
+                <a:spcPts val="0"/>
+              </a:spcAft>
+              <a:buClrTx/>
+              <a:buSzTx/>
+              <a:buFont typeface="Arial" panose="020B0604020202020204" pitchFamily="34" charset="0"/>
+              <a:buChar char="•"/>
+              <a:tabLst/>
+              <a:defRPr/>
+            </a:pPr>
+            <a:r>
+              <a:rPr lang="en-GB" b="1" dirty="0"/>
+              <a:t>Performance</a:t>
+            </a:r>
+            <a:r>
+              <a:rPr lang="en-GB" dirty="0"/>
+              <a:t>:</a:t>
+            </a:r>
+          </a:p>
+          <a:p>
+            <a:pPr marL="628650" marR="0" lvl="1" indent="-171450" algn="l" defTabSz="914400" rtl="0" eaLnBrk="1" fontAlgn="auto" latinLnBrk="0" hangingPunct="1">
+              <a:lnSpc>
+                <a:spcPct val="100000"/>
+              </a:lnSpc>
+              <a:spcBef>
+                <a:spcPts val="0"/>
+              </a:spcBef>
+              <a:spcAft>
+                <a:spcPts val="0"/>
+              </a:spcAft>
+              <a:buClrTx/>
+              <a:buSzTx/>
+              <a:buFont typeface="Arial" panose="020B0604020202020204" pitchFamily="34" charset="0"/>
+              <a:buChar char="•"/>
+              <a:tabLst/>
+              <a:defRPr/>
+            </a:pPr>
+            <a:r>
+              <a:rPr lang="en-GB" dirty="0"/>
+              <a:t>Lower RMSE for Models 1 and 2 suggests better alignment with actual turnover for most businesses.</a:t>
+            </a:r>
+          </a:p>
+          <a:p>
+            <a:pPr marL="628650" marR="0" lvl="1" indent="-171450" algn="l" defTabSz="914400" rtl="0" eaLnBrk="1" fontAlgn="auto" latinLnBrk="0" hangingPunct="1">
+              <a:lnSpc>
+                <a:spcPct val="100000"/>
+              </a:lnSpc>
+              <a:spcBef>
+                <a:spcPts val="0"/>
+              </a:spcBef>
+              <a:spcAft>
+                <a:spcPts val="0"/>
+              </a:spcAft>
+              <a:buClrTx/>
+              <a:buSzTx/>
+              <a:buFont typeface="Arial" panose="020B0604020202020204" pitchFamily="34" charset="0"/>
+              <a:buChar char="•"/>
+              <a:tabLst/>
+              <a:defRPr/>
+            </a:pPr>
+            <a:r>
+              <a:rPr lang="en-GB" dirty="0"/>
+              <a:t>Model 3 achieved the best MAPE (2.603%), showing improved proportional accuracy despite higher absolute errors.</a:t>
+            </a:r>
+          </a:p>
+          <a:p>
+            <a:pPr marL="628650" marR="0" lvl="1" indent="-171450" algn="l" defTabSz="914400" rtl="0" eaLnBrk="1" fontAlgn="auto" latinLnBrk="0" hangingPunct="1">
+              <a:lnSpc>
+                <a:spcPct val="100000"/>
+              </a:lnSpc>
+              <a:spcBef>
+                <a:spcPts val="0"/>
+              </a:spcBef>
+              <a:spcAft>
+                <a:spcPts val="0"/>
+              </a:spcAft>
+              <a:buClrTx/>
+              <a:buSzTx/>
+              <a:buFont typeface="Arial" panose="020B0604020202020204" pitchFamily="34" charset="0"/>
+              <a:buChar char="•"/>
+              <a:tabLst/>
+              <a:defRPr/>
+            </a:pPr>
+            <a:r>
+              <a:rPr lang="en-GB" dirty="0"/>
+              <a:t>Model 3 achieved the highest R2 (0.48), indicating improved explanatory power compared to Models 1 and 2.</a:t>
+            </a:r>
+          </a:p>
+          <a:p>
+            <a:pPr marL="628650" marR="0" lvl="1" indent="-171450" algn="l" defTabSz="914400" rtl="0" eaLnBrk="1" fontAlgn="auto" latinLnBrk="0" hangingPunct="1">
+              <a:lnSpc>
+                <a:spcPct val="100000"/>
+              </a:lnSpc>
+              <a:spcBef>
+                <a:spcPts val="0"/>
+              </a:spcBef>
+              <a:spcAft>
+                <a:spcPts val="0"/>
+              </a:spcAft>
+              <a:buClrTx/>
+              <a:buSzTx/>
+              <a:buFont typeface="Arial" panose="020B0604020202020204" pitchFamily="34" charset="0"/>
+              <a:buChar char="•"/>
+              <a:tabLst/>
+              <a:defRPr/>
+            </a:pPr>
+            <a:r>
+              <a:rPr lang="en-GB" dirty="0"/>
+              <a:t>Models 1 and 2 showed low negative predictions (&lt;0.1%), whereas Model 3 had higher negatives (0.2%), reflecting challenges in handling sparse or extreme data.</a:t>
+            </a:r>
+          </a:p>
+          <a:p>
+            <a:pPr marL="0" indent="0">
+              <a:buFont typeface="Arial" panose="020B0604020202020204" pitchFamily="34" charset="0"/>
+              <a:buNone/>
+            </a:pPr>
+            <a:endParaRPr lang="en-GB" dirty="0"/>
+          </a:p>
+        </p:txBody>
+      </p:sp>
+      <p:sp>
+        <p:nvSpPr>
+          <p:cNvPr id="4" name="Slide Number Placeholder 3"/>
+          <p:cNvSpPr>
+            <a:spLocks noGrp="1"/>
+          </p:cNvSpPr>
+          <p:nvPr>
+            <p:ph type="sldNum" sz="quarter" idx="5"/>
+          </p:nvPr>
+        </p:nvSpPr>
+        <p:spPr/>
+        <p:txBody>
+          <a:bodyPr/>
+          <a:lstStyle/>
+          <a:p>
+            <a:pPr rtl="0"/>
+            <a:fld id="{333E963C-1534-4F8D-B2A7-66D81AA25953}" type="slidenum">
+              <a:rPr lang="en-GB" noProof="0" smtClean="0"/>
+              <a:t>9</a:t>
+            </a:fld>
+            <a:endParaRPr lang="en-GB" noProof="0"/>
+          </a:p>
+        </p:txBody>
+      </p:sp>
+    </p:spTree>
+    <p:extLst>
+      <p:ext uri="{BB962C8B-B14F-4D97-AF65-F5344CB8AC3E}">
+        <p14:creationId xmlns:p14="http://schemas.microsoft.com/office/powerpoint/2010/main" val="1914047820"/>
       </p:ext>
     </p:extLst>
   </p:cSld>
@@ -1177,7 +4012,7 @@
             <a:pPr rtl="0"/>
             <a:fld id="{A8B959B2-FED7-4052-B7EC-A63C13ADE6D0}" type="datetime1">
               <a:rPr lang="en-GB" noProof="0" smtClean="0"/>
-              <a:t>24/11/2024</a:t>
+              <a:t>25/11/2024</a:t>
             </a:fld>
             <a:endParaRPr lang="en-GB" noProof="0"/>
           </a:p>
@@ -1455,7 +4290,7 @@
             <a:pPr rtl="0"/>
             <a:fld id="{D143F135-23C4-495B-9679-6EF4D9FB8335}" type="datetime1">
               <a:rPr lang="en-GB" noProof="0" smtClean="0"/>
-              <a:t>24/11/2024</a:t>
+              <a:t>25/11/2024</a:t>
             </a:fld>
             <a:endParaRPr lang="en-GB" noProof="0"/>
           </a:p>
@@ -1651,7 +4486,7 @@
             <a:pPr rtl="0"/>
             <a:fld id="{EBE2DE12-B74C-45D8-AB12-2D1D34E5EC08}" type="datetime1">
               <a:rPr lang="en-GB" noProof="0" smtClean="0"/>
-              <a:t>24/11/2024</a:t>
+              <a:t>25/11/2024</a:t>
             </a:fld>
             <a:endParaRPr lang="en-GB" noProof="0"/>
           </a:p>
@@ -1987,7 +4822,7 @@
             <a:pPr rtl="0"/>
             <a:fld id="{7A7F6CCD-8DB1-4A9E-9735-17141C4AC6D0}" type="datetime1">
               <a:rPr lang="en-GB" noProof="0" smtClean="0"/>
-              <a:t>24/11/2024</a:t>
+              <a:t>25/11/2024</a:t>
             </a:fld>
             <a:endParaRPr lang="en-GB" noProof="0"/>
           </a:p>
@@ -2236,7 +5071,7 @@
             <a:pPr rtl="0"/>
             <a:fld id="{2E3F8DF2-EAD5-49B8-8EAA-B799F871F1B1}" type="datetime1">
               <a:rPr lang="en-GB" noProof="0" smtClean="0"/>
-              <a:t>24/11/2024</a:t>
+              <a:t>25/11/2024</a:t>
             </a:fld>
             <a:endParaRPr lang="en-GB" noProof="0"/>
           </a:p>
@@ -2536,7 +5371,7 @@
             <a:pPr rtl="0"/>
             <a:fld id="{A0AFF820-3C61-40C8-B2E3-B9372889A0CB}" type="datetime1">
               <a:rPr lang="en-GB" noProof="0" smtClean="0"/>
-              <a:t>24/11/2024</a:t>
+              <a:t>25/11/2024</a:t>
             </a:fld>
             <a:endParaRPr lang="en-GB" noProof="0"/>
           </a:p>
@@ -2809,7 +5644,7 @@
             <a:pPr rtl="0"/>
             <a:fld id="{01311F49-052E-4FFA-83E4-737C277185F7}" type="datetime1">
               <a:rPr lang="en-GB" noProof="0" smtClean="0"/>
-              <a:t>24/11/2024</a:t>
+              <a:t>25/11/2024</a:t>
             </a:fld>
             <a:endParaRPr lang="en-GB" noProof="0"/>
           </a:p>
@@ -3434,7 +6269,7 @@
             <a:pPr rtl="0"/>
             <a:fld id="{19DAC706-3F90-4D1A-B3C3-B2B9ECC98B1B}" type="datetime1">
               <a:rPr lang="en-GB" noProof="0" smtClean="0"/>
-              <a:t>24/11/2024</a:t>
+              <a:t>25/11/2024</a:t>
             </a:fld>
             <a:endParaRPr lang="en-GB" noProof="0"/>
           </a:p>
@@ -4299,7 +7134,7 @@
             <a:pPr rtl="0"/>
             <a:fld id="{84472CDD-E335-4904-9D8C-2942935C7724}" type="datetime1">
               <a:rPr lang="en-GB" noProof="0" smtClean="0"/>
-              <a:t>24/11/2024</a:t>
+              <a:t>25/11/2024</a:t>
             </a:fld>
             <a:endParaRPr lang="en-GB" noProof="0"/>
           </a:p>
@@ -4471,7 +7306,7 @@
             <a:pPr rtl="0"/>
             <a:fld id="{2AFD2FD4-B9E6-4D47-8564-10196CCB8564}" type="datetime1">
               <a:rPr lang="en-GB" noProof="0" smtClean="0"/>
-              <a:t>24/11/2024</a:t>
+              <a:t>25/11/2024</a:t>
             </a:fld>
             <a:endParaRPr lang="en-GB" noProof="0"/>
           </a:p>
@@ -4653,7 +7488,7 @@
             <a:pPr rtl="0"/>
             <a:fld id="{D784EA8C-0295-43E1-9527-DBC260A8B8E4}" type="datetime1">
               <a:rPr lang="en-GB" noProof="0" smtClean="0"/>
-              <a:t>24/11/2024</a:t>
+              <a:t>25/11/2024</a:t>
             </a:fld>
             <a:endParaRPr lang="en-GB" noProof="0"/>
           </a:p>
@@ -4825,7 +7660,7 @@
             <a:pPr rtl="0"/>
             <a:fld id="{80E9567D-0EDD-4D5A-A3A5-88E6044EE497}" type="datetime1">
               <a:rPr lang="en-GB" noProof="0" smtClean="0"/>
-              <a:t>24/11/2024</a:t>
+              <a:t>25/11/2024</a:t>
             </a:fld>
             <a:endParaRPr lang="en-GB" noProof="0"/>
           </a:p>
@@ -5074,7 +7909,7 @@
             <a:pPr rtl="0"/>
             <a:fld id="{06E27234-02CA-4EED-BAE6-72E1CA73095C}" type="datetime1">
               <a:rPr lang="en-GB" noProof="0" smtClean="0"/>
-              <a:t>24/11/2024</a:t>
+              <a:t>25/11/2024</a:t>
             </a:fld>
             <a:endParaRPr lang="en-GB" noProof="0"/>
           </a:p>
@@ -5368,7 +8203,7 @@
             <a:pPr rtl="0"/>
             <a:fld id="{DC09ECB4-45D2-4E27-848B-5A68767E6449}" type="datetime1">
               <a:rPr lang="en-GB" noProof="0" smtClean="0"/>
-              <a:t>24/11/2024</a:t>
+              <a:t>25/11/2024</a:t>
             </a:fld>
             <a:endParaRPr lang="en-GB" noProof="0"/>
           </a:p>
@@ -5814,7 +8649,7 @@
             <a:pPr rtl="0"/>
             <a:fld id="{0CE070C2-8137-4846-B0A8-33981A2A876D}" type="datetime1">
               <a:rPr lang="en-GB" noProof="0" smtClean="0"/>
-              <a:t>24/11/2024</a:t>
+              <a:t>25/11/2024</a:t>
             </a:fld>
             <a:endParaRPr lang="en-GB" noProof="0"/>
           </a:p>
@@ -5934,7 +8769,7 @@
             <a:pPr rtl="0"/>
             <a:fld id="{6486FF59-E2ED-4C88-AE44-F57A73D391B6}" type="datetime1">
               <a:rPr lang="en-GB" noProof="0" smtClean="0"/>
-              <a:t>24/11/2024</a:t>
+              <a:t>25/11/2024</a:t>
             </a:fld>
             <a:endParaRPr lang="en-GB" noProof="0"/>
           </a:p>
@@ -6030,7 +8865,7 @@
             <a:pPr rtl="0"/>
             <a:fld id="{E44CA9CC-A944-4823-8057-F99E1F141559}" type="datetime1">
               <a:rPr lang="en-GB" noProof="0" smtClean="0"/>
-              <a:t>24/11/2024</a:t>
+              <a:t>25/11/2024</a:t>
             </a:fld>
             <a:endParaRPr lang="en-GB" noProof="0"/>
           </a:p>
@@ -6311,7 +9146,7 @@
             <a:pPr rtl="0"/>
             <a:fld id="{0DE0F3FB-87D7-4D51-8162-318BDE62EC89}" type="datetime1">
               <a:rPr lang="en-GB" noProof="0" smtClean="0"/>
-              <a:t>24/11/2024</a:t>
+              <a:t>25/11/2024</a:t>
             </a:fld>
             <a:endParaRPr lang="en-GB" noProof="0"/>
           </a:p>
@@ -6589,7 +9424,7 @@
             <a:pPr rtl="0"/>
             <a:fld id="{1ED7C955-8C04-46EA-B599-C992310ED200}" type="datetime1">
               <a:rPr lang="en-GB" noProof="0" smtClean="0"/>
-              <a:t>24/11/2024</a:t>
+              <a:t>25/11/2024</a:t>
             </a:fld>
             <a:endParaRPr lang="en-GB" noProof="0"/>
           </a:p>
@@ -6991,7 +9826,7 @@
             <a:pPr rtl="0"/>
             <a:fld id="{561CC57F-2139-4EED-A3EA-185C410F7286}" type="datetime1">
               <a:rPr lang="en-GB" noProof="0" smtClean="0"/>
-              <a:t>24/11/2024</a:t>
+              <a:t>25/11/2024</a:t>
             </a:fld>
             <a:endParaRPr lang="en-GB" noProof="0"/>
           </a:p>
@@ -7785,7 +10620,7 @@
           <p:nvPr/>
         </p:nvPicPr>
         <p:blipFill>
-          <a:blip r:embed="rId2"/>
+          <a:blip r:embed="rId3"/>
           <a:srcRect l="13817" r="16315" b="-2"/>
           <a:stretch/>
         </p:blipFill>
@@ -8520,7 +11355,7 @@
           <p:nvPr/>
         </p:nvPicPr>
         <p:blipFill>
-          <a:blip r:embed="rId2">
+          <a:blip r:embed="rId3">
             <a:extLst>
               <a:ext uri="{28A0092B-C50C-407E-A947-70E740481C1C}">
                 <a14:useLocalDpi xmlns:a14="http://schemas.microsoft.com/office/drawing/2010/main" val="0"/>
@@ -8686,8 +11521,8 @@
           </a:p>
         </p:txBody>
       </p:sp>
-      <mc:AlternateContent xmlns:mc="http://schemas.openxmlformats.org/markup-compatibility/2006">
-        <mc:Choice xmlns:a14="http://schemas.microsoft.com/office/drawing/2010/main" Requires="a14">
+      <mc:AlternateContent xmlns:mc="http://schemas.openxmlformats.org/markup-compatibility/2006" xmlns:a14="http://schemas.microsoft.com/office/drawing/2010/main">
+        <mc:Choice Requires="a14">
           <p:sp>
             <p:nvSpPr>
               <p:cNvPr id="4" name="Content Placeholder 3">
@@ -8826,7 +11661,7 @@
             </p:txBody>
           </p:sp>
         </mc:Choice>
-        <mc:Fallback>
+        <mc:Fallback xmlns="">
           <p:sp>
             <p:nvSpPr>
               <p:cNvPr id="4" name="Content Placeholder 3">
@@ -8849,7 +11684,7 @@
                 <a:ext cx="5877107" cy="4200245"/>
               </a:xfrm>
               <a:blipFill>
-                <a:blip r:embed="rId2"/>
+                <a:blip r:embed="rId3"/>
                 <a:stretch>
                   <a:fillRect l="-934"/>
                 </a:stretch>
@@ -8885,7 +11720,7 @@
           <p:nvPr/>
         </p:nvPicPr>
         <p:blipFill>
-          <a:blip r:embed="rId3">
+          <a:blip r:embed="rId4">
             <a:extLst>
               <a:ext uri="{28A0092B-C50C-407E-A947-70E740481C1C}">
                 <a14:useLocalDpi xmlns:a14="http://schemas.microsoft.com/office/drawing/2010/main" val="0"/>
@@ -9096,7 +11931,7 @@
           <p:nvPr/>
         </p:nvPicPr>
         <p:blipFill>
-          <a:blip r:embed="rId2">
+          <a:blip r:embed="rId3">
             <a:extLst>
               <a:ext uri="{28A0092B-C50C-407E-A947-70E740481C1C}">
                 <a14:useLocalDpi xmlns:a14="http://schemas.microsoft.com/office/drawing/2010/main" val="0"/>
@@ -9324,8 +12159,8 @@
           </a:p>
         </p:txBody>
       </p:sp>
-      <mc:AlternateContent xmlns:mc="http://schemas.openxmlformats.org/markup-compatibility/2006">
-        <mc:Choice xmlns:a14="http://schemas.microsoft.com/office/drawing/2010/main" Requires="a14">
+      <mc:AlternateContent xmlns:mc="http://schemas.openxmlformats.org/markup-compatibility/2006" xmlns:a14="http://schemas.microsoft.com/office/drawing/2010/main">
+        <mc:Choice Requires="a14">
           <p:sp>
             <p:nvSpPr>
               <p:cNvPr id="6" name="Text Placeholder 5">
@@ -9480,7 +12315,7 @@
             </p:txBody>
           </p:sp>
         </mc:Choice>
-        <mc:Fallback>
+        <mc:Fallback xmlns="">
           <p:sp>
             <p:nvSpPr>
               <p:cNvPr id="6" name="Text Placeholder 5">
@@ -9499,7 +12334,7 @@
             </p:nvSpPr>
             <p:spPr>
               <a:blipFill>
-                <a:blip r:embed="rId2"/>
+                <a:blip r:embed="rId3"/>
                 <a:stretch>
                   <a:fillRect l="-620" t="-510"/>
                 </a:stretch>
@@ -9520,8 +12355,8 @@
           </p:sp>
         </mc:Fallback>
       </mc:AlternateContent>
-      <mc:AlternateContent xmlns:mc="http://schemas.openxmlformats.org/markup-compatibility/2006">
-        <mc:Choice xmlns:a14="http://schemas.microsoft.com/office/drawing/2010/main" Requires="a14">
+      <mc:AlternateContent xmlns:mc="http://schemas.openxmlformats.org/markup-compatibility/2006" xmlns:a14="http://schemas.microsoft.com/office/drawing/2010/main">
+        <mc:Choice Requires="a14">
           <p:sp>
             <p:nvSpPr>
               <p:cNvPr id="8" name="Text Placeholder 7">
@@ -9548,6 +12383,7 @@
               <a:bodyPr/>
               <a:lstStyle/>
               <a:p>
+                <a:pPr/>
                 <a14:m>
                   <m:oMathPara xmlns:m="http://schemas.openxmlformats.org/officeDocument/2006/math">
                     <m:oMathParaPr>
@@ -9660,6 +12496,7 @@
                 <a:endParaRPr lang="en-GB" dirty="0"/>
               </a:p>
               <a:p>
+                <a:pPr/>
                 <a14:m>
                   <m:oMathPara xmlns:m="http://schemas.openxmlformats.org/officeDocument/2006/math">
                     <m:oMathParaPr>
@@ -9743,6 +12580,7 @@
                 </a:endParaRPr>
               </a:p>
               <a:p>
+                <a:pPr/>
                 <a14:m>
                   <m:oMathPara xmlns:m="http://schemas.openxmlformats.org/officeDocument/2006/math">
                     <m:oMathParaPr>
@@ -9871,6 +12709,7 @@
                 </a:endParaRPr>
               </a:p>
               <a:p>
+                <a:pPr/>
                 <a14:m>
                   <m:oMathPara xmlns:m="http://schemas.openxmlformats.org/officeDocument/2006/math">
                     <m:oMathParaPr>
@@ -9949,7 +12788,7 @@
             </p:txBody>
           </p:sp>
         </mc:Choice>
-        <mc:Fallback>
+        <mc:Fallback xmlns="">
           <p:sp>
             <p:nvSpPr>
               <p:cNvPr id="8" name="Text Placeholder 7">
@@ -9972,7 +12811,7 @@
                 <a:ext cx="4975860" cy="4193858"/>
               </a:xfrm>
               <a:blipFill>
-                <a:blip r:embed="rId3"/>
+                <a:blip r:embed="rId4"/>
                 <a:stretch>
                   <a:fillRect/>
                 </a:stretch>
@@ -10119,7 +12958,7 @@
         </p:nvSpPr>
         <p:spPr>
           <a:xfrm>
-            <a:off x="1103312" y="4071422"/>
+            <a:off x="646111" y="3930967"/>
             <a:ext cx="4396341" cy="4200245"/>
           </a:xfrm>
         </p:spPr>
@@ -10170,7 +13009,7 @@
           <p:nvPr/>
         </p:nvPicPr>
         <p:blipFill>
-          <a:blip r:embed="rId2">
+          <a:blip r:embed="rId3">
             <a:extLst>
               <a:ext uri="{28A0092B-C50C-407E-A947-70E740481C1C}">
                 <a14:useLocalDpi xmlns:a14="http://schemas.microsoft.com/office/drawing/2010/main" val="0"/>
@@ -10260,31 +13099,37 @@
           </a:p>
         </p:txBody>
       </p:sp>
-      <p:sp>
-        <p:nvSpPr>
-          <p:cNvPr id="3" name="Content Placeholder 2">
+      <p:graphicFrame>
+        <p:nvGraphicFramePr>
+          <p:cNvPr id="9" name="Content Placeholder 8">
             <a:extLst>
               <a:ext uri="{FF2B5EF4-FFF2-40B4-BE49-F238E27FC236}">
-                <a16:creationId xmlns:a16="http://schemas.microsoft.com/office/drawing/2014/main" id="{619425CA-136E-9DAF-C8B5-BDED0DE1DF5B}"/>
+                <a16:creationId xmlns:a16="http://schemas.microsoft.com/office/drawing/2014/main" id="{1141A441-4DDF-BCFD-8BDA-AD78457C6647}"/>
               </a:ext>
             </a:extLst>
           </p:cNvPr>
-          <p:cNvSpPr>
-            <a:spLocks noGrp="1"/>
-          </p:cNvSpPr>
+          <p:cNvGraphicFramePr>
+            <a:graphicFrameLocks noGrp="1"/>
+          </p:cNvGraphicFramePr>
           <p:nvPr>
             <p:ph sz="half" idx="1"/>
-          </p:nvPr>
-        </p:nvSpPr>
-        <p:spPr/>
-        <p:txBody>
-          <a:bodyPr/>
-          <a:lstStyle/>
-          <a:p>
-            <a:endParaRPr lang="en-GB" dirty="0"/>
-          </a:p>
-        </p:txBody>
-      </p:sp>
+            <p:extLst>
+              <p:ext uri="{D42A27DB-BD31-4B8C-83A1-F6EECF244321}">
+                <p14:modId xmlns:p14="http://schemas.microsoft.com/office/powerpoint/2010/main" val="2893169987"/>
+              </p:ext>
+            </p:extLst>
+          </p:nvPr>
+        </p:nvGraphicFramePr>
+        <p:xfrm>
+          <a:off x="554673" y="1593215"/>
+          <a:ext cx="4395787" cy="4195763"/>
+        </p:xfrm>
+        <a:graphic>
+          <a:graphicData uri="http://schemas.openxmlformats.org/drawingml/2006/chart">
+            <c:chart xmlns:c="http://schemas.openxmlformats.org/drawingml/2006/chart" xmlns:r="http://schemas.openxmlformats.org/officeDocument/2006/relationships" r:id="rId3"/>
+          </a:graphicData>
+        </a:graphic>
+      </p:graphicFrame>
       <p:graphicFrame>
         <p:nvGraphicFramePr>
           <p:cNvPr id="5" name="Content Placeholder 4">
@@ -10301,7 +13146,7 @@
             <p:ph sz="half" idx="2"/>
             <p:extLst>
               <p:ext uri="{D42A27DB-BD31-4B8C-83A1-F6EECF244321}">
-                <p14:modId xmlns:p14="http://schemas.microsoft.com/office/powerpoint/2010/main" val="2658029099"/>
+                <p14:modId xmlns:p14="http://schemas.microsoft.com/office/powerpoint/2010/main" val="2053144597"/>
               </p:ext>
             </p:extLst>
           </p:nvPr>
@@ -10367,7 +13212,7 @@
                     <a:lstStyle/>
                     <a:p>
                       <a:pPr algn="r" fontAlgn="ctr"/>
-                      <a:endParaRPr lang="en-GB" sz="1200">
+                      <a:endParaRPr lang="en-GB" sz="1200" dirty="0">
                         <a:effectLst/>
                       </a:endParaRPr>
                     </a:p>
@@ -10473,7 +13318,7 @@
                     <a:p>
                       <a:pPr algn="r" fontAlgn="ctr"/>
                       <a:r>
-                        <a:rPr lang="en-GB" sz="1100" b="0" dirty="0">
+                        <a:rPr lang="en-GB" sz="1100" b="0">
                           <a:effectLst/>
                         </a:rPr>
                         <a:t>Baseline Model 1</a:t>
@@ -10488,10 +13333,10 @@
                     <a:lstStyle/>
                     <a:p>
                       <a:r>
-                        <a:rPr lang="en-GB" sz="1100">
+                        <a:rPr lang="en-GB" sz="1100" dirty="0">
                           <a:effectLst/>
                         </a:rPr>
-                        <a:t>916160.84</a:t>
+                        <a:t>916,160</a:t>
                       </a:r>
                     </a:p>
                   </a:txBody>
@@ -10503,10 +13348,10 @@
                     <a:lstStyle/>
                     <a:p>
                       <a:r>
-                        <a:rPr lang="en-GB" sz="1100">
+                        <a:rPr lang="en-GB" sz="1100" dirty="0">
                           <a:effectLst/>
                         </a:rPr>
-                        <a:t>1188264.42</a:t>
+                        <a:t>1,188,264</a:t>
                       </a:r>
                     </a:p>
                   </a:txBody>
@@ -10548,7 +13393,7 @@
                     <a:lstStyle/>
                     <a:p>
                       <a:r>
-                        <a:rPr lang="en-GB" sz="1100" dirty="0">
+                        <a:rPr lang="en-GB" sz="1100">
                           <a:effectLst/>
                         </a:rPr>
                         <a:t>0.08</a:t>
@@ -10589,7 +13434,7 @@
                         <a:rPr lang="en-GB" sz="1100" dirty="0">
                           <a:effectLst/>
                         </a:rPr>
-                        <a:t>918193.72</a:t>
+                        <a:t>918,193</a:t>
                       </a:r>
                     </a:p>
                   </a:txBody>
@@ -10604,7 +13449,7 @@
                         <a:rPr lang="en-GB" sz="1100" dirty="0">
                           <a:effectLst/>
                         </a:rPr>
-                        <a:t>1188264.42</a:t>
+                        <a:t>1,188,264</a:t>
                       </a:r>
                     </a:p>
                   </a:txBody>
@@ -10646,7 +13491,7 @@
                     <a:lstStyle/>
                     <a:p>
                       <a:r>
-                        <a:rPr lang="en-GB" sz="1100" dirty="0">
+                        <a:rPr lang="en-GB" sz="1100">
                           <a:effectLst/>
                         </a:rPr>
                         <a:t>0.09</a:t>
@@ -10684,10 +13529,40 @@
                     <a:lstStyle/>
                     <a:p>
                       <a:r>
-                        <a:rPr lang="en-GB" sz="1100">
+                        <a:rPr lang="en-GB" sz="1100" dirty="0">
                           <a:effectLst/>
                         </a:rPr>
-                        <a:t>43984098.48</a:t>
+                        <a:t>43,544,985</a:t>
+                      </a:r>
+                    </a:p>
+                  </a:txBody>
+                  <a:tcPr marL="76200" marR="76200" marT="38100" marB="38100" anchor="ctr"/>
+                </a:tc>
+                <a:tc>
+                  <a:txBody>
+                    <a:bodyPr/>
+                    <a:lstStyle/>
+                    <a:p>
+                      <a:r>
+                        <a:rPr lang="en-GB" sz="1100" dirty="0">
+                          <a:effectLst/>
+                        </a:rPr>
+                        <a:t>60,450,356</a:t>
+                      </a:r>
+                    </a:p>
+                  </a:txBody>
+                  <a:tcPr marL="76200" marR="76200" marT="38100" marB="38100" anchor="ctr"/>
+                </a:tc>
+                <a:tc>
+                  <a:txBody>
+                    <a:bodyPr/>
+                    <a:lstStyle/>
+                    <a:p>
+                      <a:r>
+                        <a:rPr lang="en-GB" sz="1100" dirty="0">
+                          <a:effectLst/>
+                        </a:rPr>
+                        <a:t>2.603</a:t>
                       </a:r>
                     </a:p>
                   </a:txBody>
@@ -10702,7 +13577,7 @@
                         <a:rPr lang="en-GB" sz="1100">
                           <a:effectLst/>
                         </a:rPr>
-                        <a:t>60556072.95</a:t>
+                        <a:t>0.48</a:t>
                       </a:r>
                     </a:p>
                   </a:txBody>
@@ -10717,37 +13592,7 @@
                         <a:rPr lang="en-GB" sz="1100" dirty="0">
                           <a:effectLst/>
                         </a:rPr>
-                        <a:t>1.096</a:t>
-                      </a:r>
-                    </a:p>
-                  </a:txBody>
-                  <a:tcPr marL="76200" marR="76200" marT="38100" marB="38100" anchor="ctr"/>
-                </a:tc>
-                <a:tc>
-                  <a:txBody>
-                    <a:bodyPr/>
-                    <a:lstStyle/>
-                    <a:p>
-                      <a:r>
-                        <a:rPr lang="en-GB" sz="1100" dirty="0">
-                          <a:effectLst/>
-                        </a:rPr>
-                        <a:t>0.47</a:t>
-                      </a:r>
-                    </a:p>
-                  </a:txBody>
-                  <a:tcPr marL="76200" marR="76200" marT="38100" marB="38100" anchor="ctr"/>
-                </a:tc>
-                <a:tc>
-                  <a:txBody>
-                    <a:bodyPr/>
-                    <a:lstStyle/>
-                    <a:p>
-                      <a:r>
-                        <a:rPr lang="en-GB" sz="1100" dirty="0">
-                          <a:effectLst/>
-                        </a:rPr>
-                        <a:t>0.17</a:t>
+                        <a:t>0.20</a:t>
                       </a:r>
                     </a:p>
                   </a:txBody>

</xml_diff>